<commit_message>
Cleanup of the slides..
</commit_message>
<xml_diff>
--- a/TEI to ePub.pptx
+++ b/TEI to ePub.pptx
@@ -7,11 +7,9 @@
   <p:sldIdLst>
     <p:sldId id="256" r:id="rId2"/>
     <p:sldId id="259" r:id="rId3"/>
-    <p:sldId id="261" r:id="rId4"/>
-    <p:sldId id="257" r:id="rId5"/>
-    <p:sldId id="258" r:id="rId6"/>
-    <p:sldId id="262" r:id="rId7"/>
-    <p:sldId id="260" r:id="rId8"/>
+    <p:sldId id="257" r:id="rId4"/>
+    <p:sldId id="258" r:id="rId5"/>
+    <p:sldId id="262" r:id="rId6"/>
   </p:sldIdLst>
   <p:sldSz cx="9144000" cy="6858000" type="screen4x3"/>
   <p:notesSz cx="6858000" cy="9144000"/>
@@ -294,7 +292,7 @@
           <a:p>
             <a:fld id="{2C61B1AF-4D53-4160-89FA-ECD7FB388A38}" type="datetimeFigureOut">
               <a:rPr lang="nl-NL" smtClean="0"/>
-              <a:t>11-10-2011</a:t>
+              <a:t>11-11-2011</a:t>
             </a:fld>
             <a:endParaRPr lang="nl-NL"/>
           </a:p>
@@ -464,7 +462,7 @@
           <a:p>
             <a:fld id="{2C61B1AF-4D53-4160-89FA-ECD7FB388A38}" type="datetimeFigureOut">
               <a:rPr lang="nl-NL" smtClean="0"/>
-              <a:t>11-10-2011</a:t>
+              <a:t>11-11-2011</a:t>
             </a:fld>
             <a:endParaRPr lang="nl-NL"/>
           </a:p>
@@ -644,7 +642,7 @@
           <a:p>
             <a:fld id="{2C61B1AF-4D53-4160-89FA-ECD7FB388A38}" type="datetimeFigureOut">
               <a:rPr lang="nl-NL" smtClean="0"/>
-              <a:t>11-10-2011</a:t>
+              <a:t>11-11-2011</a:t>
             </a:fld>
             <a:endParaRPr lang="nl-NL"/>
           </a:p>
@@ -814,7 +812,7 @@
           <a:p>
             <a:fld id="{2C61B1AF-4D53-4160-89FA-ECD7FB388A38}" type="datetimeFigureOut">
               <a:rPr lang="nl-NL" smtClean="0"/>
-              <a:t>11-10-2011</a:t>
+              <a:t>11-11-2011</a:t>
             </a:fld>
             <a:endParaRPr lang="nl-NL"/>
           </a:p>
@@ -1060,7 +1058,7 @@
           <a:p>
             <a:fld id="{2C61B1AF-4D53-4160-89FA-ECD7FB388A38}" type="datetimeFigureOut">
               <a:rPr lang="nl-NL" smtClean="0"/>
-              <a:t>11-10-2011</a:t>
+              <a:t>11-11-2011</a:t>
             </a:fld>
             <a:endParaRPr lang="nl-NL"/>
           </a:p>
@@ -1348,7 +1346,7 @@
           <a:p>
             <a:fld id="{2C61B1AF-4D53-4160-89FA-ECD7FB388A38}" type="datetimeFigureOut">
               <a:rPr lang="nl-NL" smtClean="0"/>
-              <a:t>11-10-2011</a:t>
+              <a:t>11-11-2011</a:t>
             </a:fld>
             <a:endParaRPr lang="nl-NL"/>
           </a:p>
@@ -1770,7 +1768,7 @@
           <a:p>
             <a:fld id="{2C61B1AF-4D53-4160-89FA-ECD7FB388A38}" type="datetimeFigureOut">
               <a:rPr lang="nl-NL" smtClean="0"/>
-              <a:t>11-10-2011</a:t>
+              <a:t>11-11-2011</a:t>
             </a:fld>
             <a:endParaRPr lang="nl-NL"/>
           </a:p>
@@ -1888,7 +1886,7 @@
           <a:p>
             <a:fld id="{2C61B1AF-4D53-4160-89FA-ECD7FB388A38}" type="datetimeFigureOut">
               <a:rPr lang="nl-NL" smtClean="0"/>
-              <a:t>11-10-2011</a:t>
+              <a:t>11-11-2011</a:t>
             </a:fld>
             <a:endParaRPr lang="nl-NL"/>
           </a:p>
@@ -1983,7 +1981,7 @@
           <a:p>
             <a:fld id="{2C61B1AF-4D53-4160-89FA-ECD7FB388A38}" type="datetimeFigureOut">
               <a:rPr lang="nl-NL" smtClean="0"/>
-              <a:t>11-10-2011</a:t>
+              <a:t>11-11-2011</a:t>
             </a:fld>
             <a:endParaRPr lang="nl-NL"/>
           </a:p>
@@ -2260,7 +2258,7 @@
           <a:p>
             <a:fld id="{2C61B1AF-4D53-4160-89FA-ECD7FB388A38}" type="datetimeFigureOut">
               <a:rPr lang="nl-NL" smtClean="0"/>
-              <a:t>11-10-2011</a:t>
+              <a:t>11-11-2011</a:t>
             </a:fld>
             <a:endParaRPr lang="nl-NL"/>
           </a:p>
@@ -2513,7 +2511,7 @@
           <a:p>
             <a:fld id="{2C61B1AF-4D53-4160-89FA-ECD7FB388A38}" type="datetimeFigureOut">
               <a:rPr lang="nl-NL" smtClean="0"/>
-              <a:t>11-10-2011</a:t>
+              <a:t>11-11-2011</a:t>
             </a:fld>
             <a:endParaRPr lang="nl-NL"/>
           </a:p>
@@ -2726,7 +2724,7 @@
           <a:p>
             <a:fld id="{2C61B1AF-4D53-4160-89FA-ECD7FB388A38}" type="datetimeFigureOut">
               <a:rPr lang="nl-NL" smtClean="0"/>
-              <a:t>11-10-2011</a:t>
+              <a:t>11-11-2011</a:t>
             </a:fld>
             <a:endParaRPr lang="nl-NL"/>
           </a:p>
@@ -3257,7 +3255,7 @@
           <a:p>
             <a:r>
               <a:rPr lang="nl-NL" dirty="0" smtClean="0"/>
-              <a:t>Stijlboek</a:t>
+              <a:t>Styling</a:t>
             </a:r>
             <a:endParaRPr lang="nl-NL" dirty="0"/>
           </a:p>
@@ -3328,7 +3326,7 @@
           <a:p>
             <a:r>
               <a:rPr lang="nl-NL" dirty="0" smtClean="0"/>
-              <a:t>Invoer</a:t>
+              <a:t>Input</a:t>
             </a:r>
             <a:endParaRPr lang="nl-NL" dirty="0"/>
           </a:p>
@@ -3398,9 +3396,10 @@
           <a:lstStyle/>
           <a:p>
             <a:r>
-              <a:rPr lang="nl-NL" dirty="0" smtClean="0"/>
-              <a:t>Ruw</a:t>
-            </a:r>
+              <a:rPr lang="nl-NL" dirty="0" err="1" smtClean="0"/>
+              <a:t>Raw</a:t>
+            </a:r>
+            <a:endParaRPr lang="nl-NL" dirty="0" smtClean="0"/>
           </a:p>
           <a:p>
             <a:r>
@@ -3473,7 +3472,7 @@
           <a:p>
             <a:r>
               <a:rPr lang="nl-NL" dirty="0" smtClean="0"/>
-              <a:t>Uitvoer</a:t>
+              <a:t>Output</a:t>
             </a:r>
             <a:endParaRPr lang="nl-NL" dirty="0"/>
           </a:p>
@@ -3704,17 +3703,17 @@
           <a:p>
             <a:pPr algn="ctr"/>
             <a:r>
+              <a:rPr lang="nl-NL" dirty="0" err="1" smtClean="0"/>
+              <a:t>Enrich</a:t>
+            </a:r>
+            <a:endParaRPr lang="nl-NL" dirty="0" smtClean="0"/>
+          </a:p>
+          <a:p>
+            <a:pPr algn="ctr"/>
+            <a:r>
               <a:rPr lang="nl-NL" dirty="0" smtClean="0"/>
               <a:t>E-Book</a:t>
             </a:r>
-          </a:p>
-          <a:p>
-            <a:pPr algn="ctr"/>
-            <a:r>
-              <a:rPr lang="nl-NL" dirty="0" smtClean="0"/>
-              <a:t>Verrijking</a:t>
-            </a:r>
-            <a:endParaRPr lang="nl-NL" dirty="0"/>
           </a:p>
         </p:txBody>
       </p:sp>
@@ -3826,9 +3825,10 @@
           <a:lstStyle/>
           <a:p>
             <a:r>
-              <a:rPr lang="nl-NL" dirty="0" smtClean="0"/>
-              <a:t>Verrijkt</a:t>
-            </a:r>
+              <a:rPr lang="nl-NL" dirty="0" err="1" smtClean="0"/>
+              <a:t>Enriched</a:t>
+            </a:r>
+            <a:endParaRPr lang="nl-NL" dirty="0" smtClean="0"/>
           </a:p>
           <a:p>
             <a:r>
@@ -3997,7 +3997,7 @@
                   <a:schemeClr val="accent1"/>
                 </a:solidFill>
               </a:rPr>
-              <a:t>E-Book conversie</a:t>
+              <a:t>E-Book Processing</a:t>
             </a:r>
             <a:endParaRPr lang="nl-NL" dirty="0">
               <a:solidFill>
@@ -4210,14 +4210,14 @@
       </p:grpSpPr>
       <p:sp>
         <p:nvSpPr>
-          <p:cNvPr id="4" name="Afgeronde rechthoek 3"/>
+          <p:cNvPr id="11" name="Afgeronde rechthoek 10"/>
           <p:cNvSpPr/>
           <p:nvPr/>
         </p:nvSpPr>
         <p:spPr>
           <a:xfrm>
-            <a:off x="497393" y="4005064"/>
-            <a:ext cx="2016225" cy="2088232"/>
+            <a:off x="539552" y="260647"/>
+            <a:ext cx="3032720" cy="6480721"/>
           </a:xfrm>
           <a:prstGeom prst="roundRect">
             <a:avLst>
@@ -4269,8 +4269,8 @@
           <a:lstStyle/>
           <a:p>
             <a:r>
-              <a:rPr lang="nl-NL" dirty="0" smtClean="0"/>
-              <a:t>Input</a:t>
+              <a:rPr lang="nl-NL" dirty="0" err="1" smtClean="0"/>
+              <a:t>eb:main</a:t>
             </a:r>
             <a:endParaRPr lang="nl-NL" dirty="0"/>
           </a:p>
@@ -4278,14 +4278,14 @@
       </p:sp>
       <p:sp>
         <p:nvSpPr>
-          <p:cNvPr id="6" name="Afgeronde rechthoek 5"/>
+          <p:cNvPr id="5" name="Afgeronde rechthoek 4"/>
           <p:cNvSpPr/>
           <p:nvPr/>
         </p:nvSpPr>
         <p:spPr>
           <a:xfrm>
-            <a:off x="941750" y="5301208"/>
-            <a:ext cx="1109970" cy="360040"/>
+            <a:off x="1147917" y="980728"/>
+            <a:ext cx="1815989" cy="360040"/>
           </a:xfrm>
           <a:prstGeom prst="roundRect">
             <a:avLst/>
@@ -4313,8 +4313,8 @@
           <a:p>
             <a:pPr algn="ctr"/>
             <a:r>
-              <a:rPr lang="nl-NL" dirty="0" smtClean="0"/>
-              <a:t>Images</a:t>
+              <a:rPr lang="nl-NL" dirty="0" err="1" smtClean="0"/>
+              <a:t>eb:compose</a:t>
             </a:r>
             <a:endParaRPr lang="nl-NL" dirty="0"/>
           </a:p>
@@ -4322,14 +4322,326 @@
       </p:sp>
       <p:sp>
         <p:nvSpPr>
-          <p:cNvPr id="16" name="Afgeronde rechthoek 15"/>
+          <p:cNvPr id="7" name="Afgeronde rechthoek 6"/>
           <p:cNvSpPr/>
           <p:nvPr/>
         </p:nvSpPr>
         <p:spPr>
           <a:xfrm>
-            <a:off x="518472" y="476672"/>
-            <a:ext cx="2016225" cy="3024336"/>
+            <a:off x="1157775" y="1484784"/>
+            <a:ext cx="1815989" cy="360040"/>
+          </a:xfrm>
+          <a:prstGeom prst="roundRect">
+            <a:avLst/>
+          </a:prstGeom>
+        </p:spPr>
+        <p:style>
+          <a:lnRef idx="2">
+            <a:schemeClr val="accent1">
+              <a:shade val="50000"/>
+            </a:schemeClr>
+          </a:lnRef>
+          <a:fillRef idx="1">
+            <a:schemeClr val="accent1"/>
+          </a:fillRef>
+          <a:effectRef idx="0">
+            <a:schemeClr val="accent1"/>
+          </a:effectRef>
+          <a:fontRef idx="minor">
+            <a:schemeClr val="lt1"/>
+          </a:fontRef>
+        </p:style>
+        <p:txBody>
+          <a:bodyPr rtlCol="0" anchor="ctr"/>
+          <a:lstStyle/>
+          <a:p>
+            <a:pPr algn="ctr"/>
+            <a:r>
+              <a:rPr lang="nl-NL" dirty="0" err="1" smtClean="0"/>
+              <a:t>eb:mark-specials</a:t>
+            </a:r>
+            <a:endParaRPr lang="nl-NL" dirty="0"/>
+          </a:p>
+        </p:txBody>
+      </p:sp>
+      <p:sp>
+        <p:nvSpPr>
+          <p:cNvPr id="8" name="Afgeronde rechthoek 7"/>
+          <p:cNvSpPr/>
+          <p:nvPr/>
+        </p:nvSpPr>
+        <p:spPr>
+          <a:xfrm>
+            <a:off x="1157775" y="4509120"/>
+            <a:ext cx="1815989" cy="360040"/>
+          </a:xfrm>
+          <a:prstGeom prst="roundRect">
+            <a:avLst/>
+          </a:prstGeom>
+        </p:spPr>
+        <p:style>
+          <a:lnRef idx="2">
+            <a:schemeClr val="accent1">
+              <a:shade val="50000"/>
+            </a:schemeClr>
+          </a:lnRef>
+          <a:fillRef idx="1">
+            <a:schemeClr val="accent1"/>
+          </a:fillRef>
+          <a:effectRef idx="0">
+            <a:schemeClr val="accent1"/>
+          </a:effectRef>
+          <a:fontRef idx="minor">
+            <a:schemeClr val="lt1"/>
+          </a:fontRef>
+        </p:style>
+        <p:txBody>
+          <a:bodyPr rtlCol="0" anchor="ctr"/>
+          <a:lstStyle/>
+          <a:p>
+            <a:pPr algn="ctr"/>
+            <a:r>
+              <a:rPr lang="nl-NL" dirty="0" err="1"/>
+              <a:t>e</a:t>
+            </a:r>
+            <a:r>
+              <a:rPr lang="nl-NL" dirty="0" err="1" smtClean="0"/>
+              <a:t>b:insert-toc</a:t>
+            </a:r>
+            <a:endParaRPr lang="nl-NL" dirty="0"/>
+          </a:p>
+        </p:txBody>
+      </p:sp>
+      <p:sp>
+        <p:nvSpPr>
+          <p:cNvPr id="9" name="Afgeronde rechthoek 8"/>
+          <p:cNvSpPr/>
+          <p:nvPr/>
+        </p:nvSpPr>
+        <p:spPr>
+          <a:xfrm>
+            <a:off x="1157775" y="5013176"/>
+            <a:ext cx="1815989" cy="360040"/>
+          </a:xfrm>
+          <a:prstGeom prst="roundRect">
+            <a:avLst/>
+          </a:prstGeom>
+        </p:spPr>
+        <p:style>
+          <a:lnRef idx="2">
+            <a:schemeClr val="accent1">
+              <a:shade val="50000"/>
+            </a:schemeClr>
+          </a:lnRef>
+          <a:fillRef idx="1">
+            <a:schemeClr val="accent1"/>
+          </a:fillRef>
+          <a:effectRef idx="0">
+            <a:schemeClr val="accent1"/>
+          </a:effectRef>
+          <a:fontRef idx="minor">
+            <a:schemeClr val="lt1"/>
+          </a:fontRef>
+        </p:style>
+        <p:txBody>
+          <a:bodyPr rtlCol="0" anchor="ctr"/>
+          <a:lstStyle/>
+          <a:p>
+            <a:pPr algn="ctr"/>
+            <a:r>
+              <a:rPr lang="nl-NL" dirty="0" err="1" smtClean="0"/>
+              <a:t>eb:paginate</a:t>
+            </a:r>
+            <a:endParaRPr lang="nl-NL" dirty="0"/>
+          </a:p>
+        </p:txBody>
+      </p:sp>
+      <p:sp>
+        <p:nvSpPr>
+          <p:cNvPr id="10" name="Afgeronde rechthoek 9"/>
+          <p:cNvSpPr/>
+          <p:nvPr/>
+        </p:nvSpPr>
+        <p:spPr>
+          <a:xfrm>
+            <a:off x="1147917" y="5517232"/>
+            <a:ext cx="1815989" cy="360040"/>
+          </a:xfrm>
+          <a:prstGeom prst="roundRect">
+            <a:avLst/>
+          </a:prstGeom>
+        </p:spPr>
+        <p:style>
+          <a:lnRef idx="2">
+            <a:schemeClr val="accent1">
+              <a:shade val="50000"/>
+            </a:schemeClr>
+          </a:lnRef>
+          <a:fillRef idx="1">
+            <a:schemeClr val="accent1"/>
+          </a:fillRef>
+          <a:effectRef idx="0">
+            <a:schemeClr val="accent1"/>
+          </a:effectRef>
+          <a:fontRef idx="minor">
+            <a:schemeClr val="lt1"/>
+          </a:fontRef>
+        </p:style>
+        <p:txBody>
+          <a:bodyPr rtlCol="0" anchor="ctr"/>
+          <a:lstStyle/>
+          <a:p>
+            <a:pPr algn="ctr"/>
+            <a:r>
+              <a:rPr lang="nl-NL" dirty="0" err="1" smtClean="0"/>
+              <a:t>eb:resolve-links</a:t>
+            </a:r>
+            <a:endParaRPr lang="nl-NL" dirty="0"/>
+          </a:p>
+        </p:txBody>
+      </p:sp>
+      <p:sp>
+        <p:nvSpPr>
+          <p:cNvPr id="12" name="Afgeronde rechthoek 11"/>
+          <p:cNvSpPr/>
+          <p:nvPr/>
+        </p:nvSpPr>
+        <p:spPr>
+          <a:xfrm>
+            <a:off x="1157775" y="2989308"/>
+            <a:ext cx="1815989" cy="360040"/>
+          </a:xfrm>
+          <a:prstGeom prst="roundRect">
+            <a:avLst/>
+          </a:prstGeom>
+        </p:spPr>
+        <p:style>
+          <a:lnRef idx="2">
+            <a:schemeClr val="accent1">
+              <a:shade val="50000"/>
+            </a:schemeClr>
+          </a:lnRef>
+          <a:fillRef idx="1">
+            <a:schemeClr val="accent1"/>
+          </a:fillRef>
+          <a:effectRef idx="0">
+            <a:schemeClr val="accent1"/>
+          </a:effectRef>
+          <a:fontRef idx="minor">
+            <a:schemeClr val="lt1"/>
+          </a:fontRef>
+        </p:style>
+        <p:txBody>
+          <a:bodyPr rtlCol="0" anchor="ctr"/>
+          <a:lstStyle/>
+          <a:p>
+            <a:pPr algn="ctr"/>
+            <a:r>
+              <a:rPr lang="nl-NL" dirty="0" err="1" smtClean="0"/>
+              <a:t>eb:insert-lof</a:t>
+            </a:r>
+            <a:endParaRPr lang="nl-NL" dirty="0"/>
+          </a:p>
+        </p:txBody>
+      </p:sp>
+      <p:sp>
+        <p:nvSpPr>
+          <p:cNvPr id="13" name="Afgeronde rechthoek 12"/>
+          <p:cNvSpPr/>
+          <p:nvPr/>
+        </p:nvSpPr>
+        <p:spPr>
+          <a:xfrm>
+            <a:off x="1157775" y="3494345"/>
+            <a:ext cx="1815989" cy="360040"/>
+          </a:xfrm>
+          <a:prstGeom prst="roundRect">
+            <a:avLst/>
+          </a:prstGeom>
+        </p:spPr>
+        <p:style>
+          <a:lnRef idx="2">
+            <a:schemeClr val="accent1">
+              <a:shade val="50000"/>
+            </a:schemeClr>
+          </a:lnRef>
+          <a:fillRef idx="1">
+            <a:schemeClr val="accent1"/>
+          </a:fillRef>
+          <a:effectRef idx="0">
+            <a:schemeClr val="accent1"/>
+          </a:effectRef>
+          <a:fontRef idx="minor">
+            <a:schemeClr val="lt1"/>
+          </a:fontRef>
+        </p:style>
+        <p:txBody>
+          <a:bodyPr rtlCol="0" anchor="ctr"/>
+          <a:lstStyle/>
+          <a:p>
+            <a:pPr algn="ctr"/>
+            <a:r>
+              <a:rPr lang="nl-NL" dirty="0" err="1" smtClean="0"/>
+              <a:t>eb:insert-lot</a:t>
+            </a:r>
+            <a:endParaRPr lang="nl-NL" dirty="0"/>
+          </a:p>
+        </p:txBody>
+      </p:sp>
+      <p:sp>
+        <p:nvSpPr>
+          <p:cNvPr id="14" name="Afgeronde rechthoek 13"/>
+          <p:cNvSpPr/>
+          <p:nvPr/>
+        </p:nvSpPr>
+        <p:spPr>
+          <a:xfrm>
+            <a:off x="1157775" y="4005064"/>
+            <a:ext cx="1815989" cy="360040"/>
+          </a:xfrm>
+          <a:prstGeom prst="roundRect">
+            <a:avLst/>
+          </a:prstGeom>
+        </p:spPr>
+        <p:style>
+          <a:lnRef idx="2">
+            <a:schemeClr val="accent1">
+              <a:shade val="50000"/>
+            </a:schemeClr>
+          </a:lnRef>
+          <a:fillRef idx="1">
+            <a:schemeClr val="accent1"/>
+          </a:fillRef>
+          <a:effectRef idx="0">
+            <a:schemeClr val="accent1"/>
+          </a:effectRef>
+          <a:fontRef idx="minor">
+            <a:schemeClr val="lt1"/>
+          </a:fontRef>
+        </p:style>
+        <p:txBody>
+          <a:bodyPr rtlCol="0" anchor="ctr"/>
+          <a:lstStyle/>
+          <a:p>
+            <a:pPr algn="ctr"/>
+            <a:r>
+              <a:rPr lang="nl-NL" dirty="0" err="1" smtClean="0"/>
+              <a:t>eb:insert-index</a:t>
+            </a:r>
+            <a:endParaRPr lang="nl-NL" dirty="0"/>
+          </a:p>
+        </p:txBody>
+      </p:sp>
+      <p:sp>
+        <p:nvSpPr>
+          <p:cNvPr id="17" name="Afgeronde rechthoek 16"/>
+          <p:cNvSpPr/>
+          <p:nvPr/>
+        </p:nvSpPr>
+        <p:spPr>
+          <a:xfrm>
+            <a:off x="4518734" y="250035"/>
+            <a:ext cx="3888432" cy="6264696"/>
           </a:xfrm>
           <a:prstGeom prst="roundRect">
             <a:avLst>
@@ -4382,19 +4694,7 @@
           <a:p>
             <a:r>
               <a:rPr lang="nl-NL" dirty="0" err="1" smtClean="0"/>
-              <a:t>Customized</a:t>
-            </a:r>
-            <a:r>
-              <a:rPr lang="nl-NL" dirty="0"/>
-              <a:t> </a:t>
-            </a:r>
-            <a:r>
-              <a:rPr lang="nl-NL" dirty="0" err="1"/>
-              <a:t>l</a:t>
-            </a:r>
-            <a:r>
-              <a:rPr lang="nl-NL" dirty="0" err="1" smtClean="0"/>
-              <a:t>ayout</a:t>
+              <a:t>epub:store</a:t>
             </a:r>
             <a:endParaRPr lang="nl-NL" dirty="0"/>
           </a:p>
@@ -4402,14 +4702,14 @@
       </p:sp>
       <p:sp>
         <p:nvSpPr>
-          <p:cNvPr id="17" name="Afgeronde rechthoek 16"/>
+          <p:cNvPr id="18" name="Afgeronde rechthoek 17"/>
           <p:cNvSpPr/>
           <p:nvPr/>
         </p:nvSpPr>
         <p:spPr>
           <a:xfrm>
-            <a:off x="941750" y="1268760"/>
-            <a:ext cx="1109970" cy="360040"/>
+            <a:off x="5180365" y="1042123"/>
+            <a:ext cx="2550129" cy="360040"/>
           </a:xfrm>
           <a:prstGeom prst="roundRect">
             <a:avLst/>
@@ -4438,7 +4738,7 @@
             <a:pPr algn="ctr"/>
             <a:r>
               <a:rPr lang="nl-NL" dirty="0" err="1" smtClean="0"/>
-              <a:t>metadata</a:t>
+              <a:t>epub:compose</a:t>
             </a:r>
             <a:endParaRPr lang="nl-NL" dirty="0"/>
           </a:p>
@@ -4446,14 +4746,14 @@
       </p:sp>
       <p:sp>
         <p:nvSpPr>
-          <p:cNvPr id="18" name="Afgeronde rechthoek 17"/>
+          <p:cNvPr id="19" name="Afgeronde rechthoek 18"/>
           <p:cNvSpPr/>
           <p:nvPr/>
         </p:nvSpPr>
         <p:spPr>
           <a:xfrm>
-            <a:off x="941750" y="1772816"/>
-            <a:ext cx="1109970" cy="360040"/>
+            <a:off x="5190223" y="1546179"/>
+            <a:ext cx="2550129" cy="360040"/>
           </a:xfrm>
           <a:prstGeom prst="roundRect">
             <a:avLst/>
@@ -4481,8 +4781,8 @@
           <a:p>
             <a:pPr algn="ctr"/>
             <a:r>
-              <a:rPr lang="nl-NL" dirty="0" smtClean="0"/>
-              <a:t>front</a:t>
+              <a:rPr lang="nl-NL" dirty="0" err="1" smtClean="0"/>
+              <a:t>epub:store-mimetype</a:t>
             </a:r>
             <a:endParaRPr lang="nl-NL" dirty="0"/>
           </a:p>
@@ -4490,14 +4790,14 @@
       </p:sp>
       <p:sp>
         <p:nvSpPr>
-          <p:cNvPr id="19" name="Afgeronde rechthoek 18"/>
+          <p:cNvPr id="20" name="Afgeronde rechthoek 19"/>
           <p:cNvSpPr/>
           <p:nvPr/>
         </p:nvSpPr>
         <p:spPr>
           <a:xfrm>
-            <a:off x="941750" y="2276872"/>
-            <a:ext cx="1109970" cy="360040"/>
+            <a:off x="5190223" y="3562403"/>
+            <a:ext cx="2550129" cy="360040"/>
           </a:xfrm>
           <a:prstGeom prst="roundRect">
             <a:avLst/>
@@ -4525,8 +4825,12 @@
           <a:p>
             <a:pPr algn="ctr"/>
             <a:r>
+              <a:rPr lang="nl-NL" dirty="0" err="1"/>
+              <a:t>e</a:t>
+            </a:r>
+            <a:r>
               <a:rPr lang="nl-NL" dirty="0" err="1" smtClean="0"/>
-              <a:t>main</a:t>
+              <a:t>pub:store-pages</a:t>
             </a:r>
             <a:endParaRPr lang="nl-NL" dirty="0"/>
           </a:p>
@@ -4534,14 +4838,14 @@
       </p:sp>
       <p:sp>
         <p:nvSpPr>
-          <p:cNvPr id="20" name="Afgeronde rechthoek 19"/>
+          <p:cNvPr id="21" name="Afgeronde rechthoek 20"/>
           <p:cNvSpPr/>
           <p:nvPr/>
         </p:nvSpPr>
         <p:spPr>
           <a:xfrm>
-            <a:off x="941750" y="2789312"/>
-            <a:ext cx="1109970" cy="360040"/>
+            <a:off x="5190223" y="4066459"/>
+            <a:ext cx="2550129" cy="360040"/>
           </a:xfrm>
           <a:prstGeom prst="roundRect">
             <a:avLst/>
@@ -4569,8 +4873,8 @@
           <a:p>
             <a:pPr algn="ctr"/>
             <a:r>
-              <a:rPr lang="nl-NL" dirty="0" smtClean="0"/>
-              <a:t>back</a:t>
+              <a:rPr lang="nl-NL" dirty="0" err="1" smtClean="0"/>
+              <a:t>epub:copy-mages</a:t>
             </a:r>
             <a:endParaRPr lang="nl-NL" dirty="0"/>
           </a:p>
@@ -4578,43 +4882,18 @@
       </p:sp>
       <p:sp>
         <p:nvSpPr>
-          <p:cNvPr id="21" name="Afgeronde rechthoek 20"/>
+          <p:cNvPr id="22" name="Afgeronde rechthoek 21"/>
           <p:cNvSpPr/>
           <p:nvPr/>
         </p:nvSpPr>
         <p:spPr>
           <a:xfrm>
-            <a:off x="6588224" y="476672"/>
-            <a:ext cx="2016225" cy="3024336"/>
+            <a:off x="5180365" y="4570515"/>
+            <a:ext cx="2550129" cy="360040"/>
           </a:xfrm>
           <a:prstGeom prst="roundRect">
-            <a:avLst>
-              <a:gd name="adj" fmla="val 7300"/>
-            </a:avLst>
-          </a:prstGeom>
-          <a:gradFill>
-            <a:gsLst>
-              <a:gs pos="0">
-                <a:schemeClr val="accent1">
-                  <a:tint val="66000"/>
-                  <a:satMod val="160000"/>
-                </a:schemeClr>
-              </a:gs>
-              <a:gs pos="50000">
-                <a:schemeClr val="accent1">
-                  <a:tint val="44500"/>
-                  <a:satMod val="160000"/>
-                </a:schemeClr>
-              </a:gs>
-              <a:gs pos="100000">
-                <a:schemeClr val="accent1">
-                  <a:tint val="23500"/>
-                  <a:satMod val="160000"/>
-                </a:schemeClr>
-              </a:gs>
-            </a:gsLst>
-            <a:lin ang="5400000" scaled="0"/>
-          </a:gradFill>
+            <a:avLst/>
+          </a:prstGeom>
         </p:spPr>
         <p:style>
           <a:lnRef idx="2">
@@ -4633,12 +4912,13 @@
           </a:fontRef>
         </p:style>
         <p:txBody>
-          <a:bodyPr rtlCol="0" anchor="t" anchorCtr="0"/>
-          <a:lstStyle/>
-          <a:p>
-            <a:r>
-              <a:rPr lang="nl-NL" dirty="0" smtClean="0"/>
-              <a:t>E-Book</a:t>
+          <a:bodyPr rtlCol="0" anchor="ctr"/>
+          <a:lstStyle/>
+          <a:p>
+            <a:pPr algn="ctr"/>
+            <a:r>
+              <a:rPr lang="nl-NL" dirty="0" err="1" smtClean="0"/>
+              <a:t>epub:copy-styles</a:t>
             </a:r>
             <a:endParaRPr lang="nl-NL" dirty="0"/>
           </a:p>
@@ -4646,14 +4926,14 @@
       </p:sp>
       <p:sp>
         <p:nvSpPr>
-          <p:cNvPr id="22" name="Afgeronde rechthoek 21"/>
+          <p:cNvPr id="23" name="Afgeronde rechthoek 22"/>
           <p:cNvSpPr/>
           <p:nvPr/>
         </p:nvSpPr>
         <p:spPr>
           <a:xfrm>
-            <a:off x="7020272" y="1268760"/>
-            <a:ext cx="1109970" cy="360040"/>
+            <a:off x="5190223" y="2050235"/>
+            <a:ext cx="2550129" cy="360040"/>
           </a:xfrm>
           <a:prstGeom prst="roundRect">
             <a:avLst/>
@@ -4682,7 +4962,7 @@
             <a:pPr algn="ctr"/>
             <a:r>
               <a:rPr lang="nl-NL" dirty="0" err="1" smtClean="0"/>
-              <a:t>metadata</a:t>
+              <a:t>epub:store-container</a:t>
             </a:r>
             <a:endParaRPr lang="nl-NL" dirty="0"/>
           </a:p>
@@ -4690,14 +4970,14 @@
       </p:sp>
       <p:sp>
         <p:nvSpPr>
-          <p:cNvPr id="23" name="Afgeronde rechthoek 22"/>
+          <p:cNvPr id="24" name="Afgeronde rechthoek 23"/>
           <p:cNvSpPr/>
           <p:nvPr/>
         </p:nvSpPr>
         <p:spPr>
           <a:xfrm>
-            <a:off x="7020272" y="1772816"/>
-            <a:ext cx="1109970" cy="360040"/>
+            <a:off x="5190223" y="2555272"/>
+            <a:ext cx="2550129" cy="360040"/>
           </a:xfrm>
           <a:prstGeom prst="roundRect">
             <a:avLst/>
@@ -4725,8 +5005,8 @@
           <a:p>
             <a:pPr algn="ctr"/>
             <a:r>
-              <a:rPr lang="nl-NL" dirty="0" smtClean="0"/>
-              <a:t>front</a:t>
+              <a:rPr lang="nl-NL" dirty="0" err="1" smtClean="0"/>
+              <a:t>epub:store-manifest</a:t>
             </a:r>
             <a:endParaRPr lang="nl-NL" dirty="0"/>
           </a:p>
@@ -4734,14 +5014,14 @@
       </p:sp>
       <p:sp>
         <p:nvSpPr>
-          <p:cNvPr id="24" name="Afgeronde rechthoek 23"/>
+          <p:cNvPr id="25" name="Afgeronde rechthoek 24"/>
           <p:cNvSpPr/>
           <p:nvPr/>
         </p:nvSpPr>
         <p:spPr>
           <a:xfrm>
-            <a:off x="7020272" y="2276872"/>
-            <a:ext cx="1109970" cy="360040"/>
+            <a:off x="5190223" y="3065991"/>
+            <a:ext cx="2550129" cy="360040"/>
           </a:xfrm>
           <a:prstGeom prst="roundRect">
             <a:avLst/>
@@ -4770,7 +5050,7 @@
             <a:pPr algn="ctr"/>
             <a:r>
               <a:rPr lang="nl-NL" dirty="0" err="1" smtClean="0"/>
-              <a:t>main</a:t>
+              <a:t>epub:store-navigation</a:t>
             </a:r>
             <a:endParaRPr lang="nl-NL" dirty="0"/>
           </a:p>
@@ -4778,14 +5058,14 @@
       </p:sp>
       <p:sp>
         <p:nvSpPr>
-          <p:cNvPr id="25" name="Afgeronde rechthoek 24"/>
+          <p:cNvPr id="26" name="Afgeronde rechthoek 25"/>
           <p:cNvSpPr/>
           <p:nvPr/>
         </p:nvSpPr>
         <p:spPr>
           <a:xfrm>
-            <a:off x="7020272" y="2789312"/>
-            <a:ext cx="1109970" cy="360040"/>
+            <a:off x="1147916" y="2485252"/>
+            <a:ext cx="1815989" cy="360040"/>
           </a:xfrm>
           <a:prstGeom prst="roundRect">
             <a:avLst/>
@@ -4813,512 +5093,23 @@
           <a:p>
             <a:pPr algn="ctr"/>
             <a:r>
-              <a:rPr lang="nl-NL" dirty="0" smtClean="0"/>
-              <a:t>back</a:t>
+              <a:rPr lang="nl-NL" dirty="0" err="1" smtClean="0"/>
+              <a:t>eb:insert-notes</a:t>
             </a:r>
             <a:endParaRPr lang="nl-NL" dirty="0"/>
           </a:p>
         </p:txBody>
       </p:sp>
-      <p:cxnSp>
-        <p:nvCxnSpPr>
-          <p:cNvPr id="33" name="Rechte verbindingslijn met pijl 32"/>
-          <p:cNvCxnSpPr>
-            <a:stCxn id="17" idx="3"/>
-            <a:endCxn id="22" idx="1"/>
-          </p:cNvCxnSpPr>
-          <p:nvPr/>
-        </p:nvCxnSpPr>
-        <p:spPr>
-          <a:xfrm>
-            <a:off x="2051720" y="1448780"/>
-            <a:ext cx="4968552" cy="0"/>
-          </a:xfrm>
-          <a:prstGeom prst="straightConnector1">
-            <a:avLst/>
-          </a:prstGeom>
-          <a:ln w="19050">
-            <a:tailEnd type="arrow"/>
-          </a:ln>
-        </p:spPr>
-        <p:style>
-          <a:lnRef idx="1">
-            <a:schemeClr val="accent1"/>
-          </a:lnRef>
-          <a:fillRef idx="0">
-            <a:schemeClr val="accent1"/>
-          </a:fillRef>
-          <a:effectRef idx="0">
-            <a:schemeClr val="accent1"/>
-          </a:effectRef>
-          <a:fontRef idx="minor">
-            <a:schemeClr val="tx1"/>
-          </a:fontRef>
-        </p:style>
-      </p:cxnSp>
-      <p:cxnSp>
-        <p:nvCxnSpPr>
-          <p:cNvPr id="36" name="Rechte verbindingslijn met pijl 35"/>
-          <p:cNvCxnSpPr>
-            <a:stCxn id="18" idx="3"/>
-            <a:endCxn id="23" idx="1"/>
-          </p:cNvCxnSpPr>
-          <p:nvPr/>
-        </p:nvCxnSpPr>
-        <p:spPr>
-          <a:xfrm>
-            <a:off x="2051720" y="1952836"/>
-            <a:ext cx="4968552" cy="0"/>
-          </a:xfrm>
-          <a:prstGeom prst="straightConnector1">
-            <a:avLst/>
-          </a:prstGeom>
-          <a:ln w="19050">
-            <a:tailEnd type="arrow"/>
-          </a:ln>
-        </p:spPr>
-        <p:style>
-          <a:lnRef idx="1">
-            <a:schemeClr val="accent1"/>
-          </a:lnRef>
-          <a:fillRef idx="0">
-            <a:schemeClr val="accent1"/>
-          </a:fillRef>
-          <a:effectRef idx="0">
-            <a:schemeClr val="accent1"/>
-          </a:effectRef>
-          <a:fontRef idx="minor">
-            <a:schemeClr val="tx1"/>
-          </a:fontRef>
-        </p:style>
-      </p:cxnSp>
-      <p:cxnSp>
-        <p:nvCxnSpPr>
-          <p:cNvPr id="37" name="Rechte verbindingslijn met pijl 36"/>
-          <p:cNvCxnSpPr>
-            <a:stCxn id="19" idx="3"/>
-            <a:endCxn id="24" idx="1"/>
-          </p:cNvCxnSpPr>
-          <p:nvPr/>
-        </p:nvCxnSpPr>
-        <p:spPr>
-          <a:xfrm>
-            <a:off x="2051720" y="2456892"/>
-            <a:ext cx="4968552" cy="0"/>
-          </a:xfrm>
-          <a:prstGeom prst="straightConnector1">
-            <a:avLst/>
-          </a:prstGeom>
-          <a:ln w="19050">
-            <a:tailEnd type="arrow"/>
-          </a:ln>
-        </p:spPr>
-        <p:style>
-          <a:lnRef idx="1">
-            <a:schemeClr val="accent1"/>
-          </a:lnRef>
-          <a:fillRef idx="0">
-            <a:schemeClr val="accent1"/>
-          </a:fillRef>
-          <a:effectRef idx="0">
-            <a:schemeClr val="accent1"/>
-          </a:effectRef>
-          <a:fontRef idx="minor">
-            <a:schemeClr val="tx1"/>
-          </a:fontRef>
-        </p:style>
-      </p:cxnSp>
-      <p:cxnSp>
-        <p:nvCxnSpPr>
-          <p:cNvPr id="38" name="Rechte verbindingslijn met pijl 37"/>
-          <p:cNvCxnSpPr>
-            <a:stCxn id="20" idx="3"/>
-            <a:endCxn id="25" idx="1"/>
-          </p:cNvCxnSpPr>
-          <p:nvPr/>
-        </p:nvCxnSpPr>
-        <p:spPr>
-          <a:xfrm>
-            <a:off x="2051720" y="2969332"/>
-            <a:ext cx="4968552" cy="0"/>
-          </a:xfrm>
-          <a:prstGeom prst="straightConnector1">
-            <a:avLst/>
-          </a:prstGeom>
-          <a:ln w="19050">
-            <a:tailEnd type="arrow"/>
-          </a:ln>
-        </p:spPr>
-        <p:style>
-          <a:lnRef idx="1">
-            <a:schemeClr val="accent1"/>
-          </a:lnRef>
-          <a:fillRef idx="0">
-            <a:schemeClr val="accent1"/>
-          </a:fillRef>
-          <a:effectRef idx="0">
-            <a:schemeClr val="accent1"/>
-          </a:effectRef>
-          <a:fontRef idx="minor">
-            <a:schemeClr val="tx1"/>
-          </a:fontRef>
-        </p:style>
-      </p:cxnSp>
-      <p:cxnSp>
-        <p:nvCxnSpPr>
-          <p:cNvPr id="51" name="Rechte verbindingslijn met pijl 47"/>
-          <p:cNvCxnSpPr/>
-          <p:nvPr/>
-        </p:nvCxnSpPr>
-        <p:spPr>
-          <a:xfrm flipV="1">
-            <a:off x="1979712" y="1949380"/>
-            <a:ext cx="3227516" cy="3027792"/>
-          </a:xfrm>
-          <a:prstGeom prst="bentConnector2">
-            <a:avLst/>
-          </a:prstGeom>
-          <a:ln w="19050">
-            <a:tailEnd type="arrow"/>
-          </a:ln>
-        </p:spPr>
-        <p:style>
-          <a:lnRef idx="1">
-            <a:schemeClr val="accent1"/>
-          </a:lnRef>
-          <a:fillRef idx="0">
-            <a:schemeClr val="accent1"/>
-          </a:fillRef>
-          <a:effectRef idx="0">
-            <a:schemeClr val="accent1"/>
-          </a:effectRef>
-          <a:fontRef idx="minor">
-            <a:schemeClr val="tx1"/>
-          </a:fontRef>
-        </p:style>
-      </p:cxnSp>
-      <p:cxnSp>
-        <p:nvCxnSpPr>
-          <p:cNvPr id="55" name="Rechte verbindingslijn met pijl 47"/>
-          <p:cNvCxnSpPr/>
-          <p:nvPr/>
-        </p:nvCxnSpPr>
-        <p:spPr>
-          <a:xfrm flipV="1">
-            <a:off x="1979712" y="2471192"/>
-            <a:ext cx="3844026" cy="3010036"/>
-          </a:xfrm>
-          <a:prstGeom prst="bentConnector2">
-            <a:avLst/>
-          </a:prstGeom>
-          <a:ln w="19050">
-            <a:tailEnd type="arrow"/>
-          </a:ln>
-        </p:spPr>
-        <p:style>
-          <a:lnRef idx="1">
-            <a:schemeClr val="accent1"/>
-          </a:lnRef>
-          <a:fillRef idx="0">
-            <a:schemeClr val="accent1"/>
-          </a:fillRef>
-          <a:effectRef idx="0">
-            <a:schemeClr val="accent1"/>
-          </a:effectRef>
-          <a:fontRef idx="minor">
-            <a:schemeClr val="tx1"/>
-          </a:fontRef>
-        </p:style>
-      </p:cxnSp>
-      <p:sp>
-        <p:nvSpPr>
-          <p:cNvPr id="60" name="Tekstvak 59"/>
-          <p:cNvSpPr txBox="1"/>
-          <p:nvPr/>
-        </p:nvSpPr>
-        <p:spPr>
-          <a:xfrm>
-            <a:off x="3472210" y="4581128"/>
-            <a:ext cx="1027782" cy="276999"/>
-          </a:xfrm>
-          <a:prstGeom prst="rect">
-            <a:avLst/>
-          </a:prstGeom>
-          <a:noFill/>
-        </p:spPr>
-        <p:txBody>
-          <a:bodyPr wrap="none" rtlCol="0">
-            <a:spAutoFit/>
-          </a:bodyPr>
-          <a:lstStyle/>
-          <a:p>
-            <a:r>
-              <a:rPr lang="nl-NL" sz="1200" dirty="0" smtClean="0"/>
-              <a:t>get </a:t>
-            </a:r>
-            <a:r>
-              <a:rPr lang="nl-NL" sz="1200" dirty="0" err="1" smtClean="0"/>
-              <a:t>metadata</a:t>
-            </a:r>
-            <a:endParaRPr lang="nl-NL" sz="1200" dirty="0"/>
-          </a:p>
-        </p:txBody>
-      </p:sp>
-      <p:sp>
-        <p:nvSpPr>
-          <p:cNvPr id="61" name="Tekstvak 60"/>
-          <p:cNvSpPr txBox="1"/>
-          <p:nvPr/>
-        </p:nvSpPr>
-        <p:spPr>
-          <a:xfrm>
-            <a:off x="3563888" y="5013176"/>
-            <a:ext cx="1224631" cy="276999"/>
-          </a:xfrm>
-          <a:prstGeom prst="rect">
-            <a:avLst/>
-          </a:prstGeom>
-          <a:noFill/>
-        </p:spPr>
-        <p:txBody>
-          <a:bodyPr wrap="none" rtlCol="0">
-            <a:spAutoFit/>
-          </a:bodyPr>
-          <a:lstStyle/>
-          <a:p>
-            <a:r>
-              <a:rPr lang="nl-NL" sz="1200" dirty="0" smtClean="0"/>
-              <a:t>get front-matter</a:t>
-            </a:r>
-            <a:endParaRPr lang="nl-NL" sz="1200" dirty="0"/>
-          </a:p>
-        </p:txBody>
-      </p:sp>
-      <p:sp>
-        <p:nvSpPr>
-          <p:cNvPr id="62" name="Tekstvak 61"/>
-          <p:cNvSpPr txBox="1"/>
-          <p:nvPr/>
-        </p:nvSpPr>
-        <p:spPr>
-          <a:xfrm>
-            <a:off x="3703499" y="5481228"/>
-            <a:ext cx="1228541" cy="276999"/>
-          </a:xfrm>
-          <a:prstGeom prst="rect">
-            <a:avLst/>
-          </a:prstGeom>
-          <a:noFill/>
-        </p:spPr>
-        <p:txBody>
-          <a:bodyPr wrap="none" rtlCol="0">
-            <a:spAutoFit/>
-          </a:bodyPr>
-          <a:lstStyle/>
-          <a:p>
-            <a:r>
-              <a:rPr lang="nl-NL" sz="1200" dirty="0" smtClean="0"/>
-              <a:t>get </a:t>
-            </a:r>
-            <a:r>
-              <a:rPr lang="nl-NL" sz="1200" dirty="0" err="1" smtClean="0"/>
-              <a:t>main</a:t>
-            </a:r>
-            <a:r>
-              <a:rPr lang="nl-NL" sz="1200" dirty="0" smtClean="0"/>
-              <a:t>-matter</a:t>
-            </a:r>
-            <a:endParaRPr lang="nl-NL" sz="1200" dirty="0"/>
-          </a:p>
-        </p:txBody>
-      </p:sp>
-      <p:sp>
-        <p:nvSpPr>
-          <p:cNvPr id="63" name="Tekstvak 62"/>
-          <p:cNvSpPr txBox="1"/>
-          <p:nvPr/>
-        </p:nvSpPr>
-        <p:spPr>
-          <a:xfrm>
-            <a:off x="2572400" y="1162411"/>
-            <a:ext cx="1135504" cy="276999"/>
-          </a:xfrm>
-          <a:prstGeom prst="rect">
-            <a:avLst/>
-          </a:prstGeom>
-          <a:noFill/>
-        </p:spPr>
-        <p:txBody>
-          <a:bodyPr wrap="none" rtlCol="0">
-            <a:spAutoFit/>
-          </a:bodyPr>
-          <a:lstStyle/>
-          <a:p>
-            <a:r>
-              <a:rPr lang="nl-NL" sz="1200" dirty="0" smtClean="0"/>
-              <a:t>extra </a:t>
-            </a:r>
-            <a:r>
-              <a:rPr lang="nl-NL" sz="1200" dirty="0" err="1" smtClean="0"/>
-              <a:t>metadata</a:t>
-            </a:r>
-            <a:endParaRPr lang="nl-NL" sz="1200" dirty="0"/>
-          </a:p>
-        </p:txBody>
-      </p:sp>
-      <p:sp>
-        <p:nvSpPr>
-          <p:cNvPr id="79" name="Tekstvak 78"/>
-          <p:cNvSpPr txBox="1"/>
-          <p:nvPr/>
-        </p:nvSpPr>
-        <p:spPr>
-          <a:xfrm>
-            <a:off x="2699792" y="1672381"/>
-            <a:ext cx="789127" cy="276999"/>
-          </a:xfrm>
-          <a:prstGeom prst="rect">
-            <a:avLst/>
-          </a:prstGeom>
-          <a:noFill/>
-        </p:spPr>
-        <p:txBody>
-          <a:bodyPr wrap="none" rtlCol="0">
-            <a:spAutoFit/>
-          </a:bodyPr>
-          <a:lstStyle/>
-          <a:p>
-            <a:r>
-              <a:rPr lang="nl-NL" sz="1200" dirty="0" err="1" smtClean="0"/>
-              <a:t>insert</a:t>
-            </a:r>
-            <a:r>
-              <a:rPr lang="nl-NL" sz="1200" dirty="0" smtClean="0"/>
-              <a:t> </a:t>
-            </a:r>
-            <a:r>
-              <a:rPr lang="nl-NL" sz="1200" dirty="0" err="1" smtClean="0"/>
-              <a:t>toc</a:t>
-            </a:r>
-            <a:endParaRPr lang="nl-NL" sz="1200" dirty="0"/>
-          </a:p>
-        </p:txBody>
-      </p:sp>
-      <p:sp>
-        <p:nvSpPr>
-          <p:cNvPr id="80" name="Tekstvak 79"/>
-          <p:cNvSpPr txBox="1"/>
-          <p:nvPr/>
-        </p:nvSpPr>
-        <p:spPr>
-          <a:xfrm>
-            <a:off x="2987824" y="2692333"/>
-            <a:ext cx="1387944" cy="276999"/>
-          </a:xfrm>
-          <a:prstGeom prst="rect">
-            <a:avLst/>
-          </a:prstGeom>
-          <a:noFill/>
-        </p:spPr>
-        <p:txBody>
-          <a:bodyPr wrap="none" rtlCol="0">
-            <a:spAutoFit/>
-          </a:bodyPr>
-          <a:lstStyle/>
-          <a:p>
-            <a:r>
-              <a:rPr lang="nl-NL" sz="1200" dirty="0" err="1" smtClean="0"/>
-              <a:t>insert</a:t>
-            </a:r>
-            <a:r>
-              <a:rPr lang="nl-NL" sz="1200" dirty="0" smtClean="0"/>
-              <a:t> lof, lot, index</a:t>
-            </a:r>
-            <a:endParaRPr lang="nl-NL" sz="1200" dirty="0"/>
-          </a:p>
-        </p:txBody>
-      </p:sp>
-      <p:sp>
-        <p:nvSpPr>
-          <p:cNvPr id="81" name="Tekstvak 80"/>
-          <p:cNvSpPr txBox="1"/>
-          <p:nvPr/>
-        </p:nvSpPr>
-        <p:spPr>
-          <a:xfrm>
-            <a:off x="2849914" y="2179893"/>
-            <a:ext cx="929998" cy="276999"/>
-          </a:xfrm>
-          <a:prstGeom prst="rect">
-            <a:avLst/>
-          </a:prstGeom>
-          <a:noFill/>
-        </p:spPr>
-        <p:txBody>
-          <a:bodyPr wrap="none" rtlCol="0">
-            <a:spAutoFit/>
-          </a:bodyPr>
-          <a:lstStyle/>
-          <a:p>
-            <a:r>
-              <a:rPr lang="nl-NL" sz="1200" dirty="0" err="1" smtClean="0"/>
-              <a:t>insert</a:t>
-            </a:r>
-            <a:r>
-              <a:rPr lang="nl-NL" sz="1200" dirty="0" smtClean="0"/>
-              <a:t> </a:t>
-            </a:r>
-            <a:r>
-              <a:rPr lang="nl-NL" sz="1200" dirty="0" err="1" smtClean="0"/>
-              <a:t>notes</a:t>
-            </a:r>
-            <a:endParaRPr lang="nl-NL" sz="1200" dirty="0"/>
-          </a:p>
-        </p:txBody>
-      </p:sp>
-      <p:cxnSp>
-        <p:nvCxnSpPr>
-          <p:cNvPr id="86" name="Rechte verbindingslijn met pijl 47"/>
-          <p:cNvCxnSpPr/>
-          <p:nvPr/>
-        </p:nvCxnSpPr>
-        <p:spPr>
-          <a:xfrm flipV="1">
-            <a:off x="2051720" y="1448780"/>
-            <a:ext cx="2536782" cy="3420380"/>
-          </a:xfrm>
-          <a:prstGeom prst="bentConnector2">
-            <a:avLst/>
-          </a:prstGeom>
-          <a:ln w="19050">
-            <a:tailEnd type="arrow"/>
-          </a:ln>
-        </p:spPr>
-        <p:style>
-          <a:lnRef idx="1">
-            <a:schemeClr val="accent1"/>
-          </a:lnRef>
-          <a:fillRef idx="0">
-            <a:schemeClr val="accent1"/>
-          </a:fillRef>
-          <a:effectRef idx="0">
-            <a:schemeClr val="accent1"/>
-          </a:effectRef>
-          <a:fontRef idx="minor">
-            <a:schemeClr val="tx1"/>
-          </a:fontRef>
-        </p:style>
-      </p:cxnSp>
-      <p:sp>
-        <p:nvSpPr>
-          <p:cNvPr id="87" name="Afgeronde rechthoek 86"/>
+      <p:sp>
+        <p:nvSpPr>
+          <p:cNvPr id="27" name="Afgeronde rechthoek 26"/>
           <p:cNvSpPr/>
           <p:nvPr/>
         </p:nvSpPr>
         <p:spPr>
           <a:xfrm>
-            <a:off x="941750" y="4725144"/>
-            <a:ext cx="1109970" cy="360040"/>
+            <a:off x="5190223" y="5074571"/>
+            <a:ext cx="2550129" cy="360040"/>
           </a:xfrm>
           <a:prstGeom prst="roundRect">
             <a:avLst/>
@@ -5346,8 +5137,212 @@
           <a:p>
             <a:pPr algn="ctr"/>
             <a:r>
-              <a:rPr lang="nl-NL" dirty="0" smtClean="0"/>
-              <a:t>XML</a:t>
+              <a:rPr lang="nl-NL" dirty="0" err="1" smtClean="0"/>
+              <a:t>epub:create-epub</a:t>
+            </a:r>
+            <a:endParaRPr lang="nl-NL" dirty="0"/>
+          </a:p>
+        </p:txBody>
+      </p:sp>
+      <p:sp>
+        <p:nvSpPr>
+          <p:cNvPr id="28" name="Afgeronde rechthoek 27"/>
+          <p:cNvSpPr/>
+          <p:nvPr/>
+        </p:nvSpPr>
+        <p:spPr>
+          <a:xfrm>
+            <a:off x="5190223" y="5578627"/>
+            <a:ext cx="2550129" cy="360040"/>
+          </a:xfrm>
+          <a:prstGeom prst="roundRect">
+            <a:avLst/>
+          </a:prstGeom>
+        </p:spPr>
+        <p:style>
+          <a:lnRef idx="2">
+            <a:schemeClr val="accent1">
+              <a:shade val="50000"/>
+            </a:schemeClr>
+          </a:lnRef>
+          <a:fillRef idx="1">
+            <a:schemeClr val="accent1"/>
+          </a:fillRef>
+          <a:effectRef idx="0">
+            <a:schemeClr val="accent1"/>
+          </a:effectRef>
+          <a:fontRef idx="minor">
+            <a:schemeClr val="lt1"/>
+          </a:fontRef>
+        </p:style>
+        <p:txBody>
+          <a:bodyPr rtlCol="0" anchor="ctr"/>
+          <a:lstStyle/>
+          <a:p>
+            <a:pPr algn="ctr"/>
+            <a:r>
+              <a:rPr lang="nl-NL" dirty="0" err="1" smtClean="0"/>
+              <a:t>epub:check-epub</a:t>
+            </a:r>
+            <a:endParaRPr lang="nl-NL" dirty="0"/>
+          </a:p>
+        </p:txBody>
+      </p:sp>
+      <p:cxnSp>
+        <p:nvCxnSpPr>
+          <p:cNvPr id="30" name="Rechte verbindingslijn met pijl 29"/>
+          <p:cNvCxnSpPr>
+            <a:stCxn id="11" idx="0"/>
+            <a:endCxn id="5" idx="0"/>
+          </p:cNvCxnSpPr>
+          <p:nvPr/>
+        </p:nvCxnSpPr>
+        <p:spPr>
+          <a:xfrm>
+            <a:off x="2055912" y="260647"/>
+            <a:ext cx="0" cy="720081"/>
+          </a:xfrm>
+          <a:prstGeom prst="straightConnector1">
+            <a:avLst/>
+          </a:prstGeom>
+          <a:ln w="19050">
+            <a:tailEnd type="arrow"/>
+          </a:ln>
+        </p:spPr>
+        <p:style>
+          <a:lnRef idx="1">
+            <a:schemeClr val="accent1"/>
+          </a:lnRef>
+          <a:fillRef idx="0">
+            <a:schemeClr val="accent1"/>
+          </a:fillRef>
+          <a:effectRef idx="0">
+            <a:schemeClr val="accent1"/>
+          </a:effectRef>
+          <a:fontRef idx="minor">
+            <a:schemeClr val="tx1"/>
+          </a:fontRef>
+        </p:style>
+      </p:cxnSp>
+      <p:cxnSp>
+        <p:nvCxnSpPr>
+          <p:cNvPr id="31" name="Rechte verbindingslijn met pijl 30"/>
+          <p:cNvCxnSpPr>
+            <a:stCxn id="17" idx="0"/>
+            <a:endCxn id="18" idx="0"/>
+          </p:cNvCxnSpPr>
+          <p:nvPr/>
+        </p:nvCxnSpPr>
+        <p:spPr>
+          <a:xfrm flipH="1">
+            <a:off x="6455430" y="250035"/>
+            <a:ext cx="7520" cy="792088"/>
+          </a:xfrm>
+          <a:prstGeom prst="straightConnector1">
+            <a:avLst/>
+          </a:prstGeom>
+          <a:ln w="19050">
+            <a:tailEnd type="arrow"/>
+          </a:ln>
+        </p:spPr>
+        <p:style>
+          <a:lnRef idx="1">
+            <a:schemeClr val="accent1"/>
+          </a:lnRef>
+          <a:fillRef idx="0">
+            <a:schemeClr val="accent1"/>
+          </a:fillRef>
+          <a:effectRef idx="0">
+            <a:schemeClr val="accent1"/>
+          </a:effectRef>
+          <a:fontRef idx="minor">
+            <a:schemeClr val="tx1"/>
+          </a:fontRef>
+        </p:style>
+      </p:cxnSp>
+      <p:sp>
+        <p:nvSpPr>
+          <p:cNvPr id="29" name="Afgeronde rechthoek 28"/>
+          <p:cNvSpPr/>
+          <p:nvPr/>
+        </p:nvSpPr>
+        <p:spPr>
+          <a:xfrm>
+            <a:off x="1157775" y="6021288"/>
+            <a:ext cx="1815989" cy="360040"/>
+          </a:xfrm>
+          <a:prstGeom prst="roundRect">
+            <a:avLst/>
+          </a:prstGeom>
+        </p:spPr>
+        <p:style>
+          <a:lnRef idx="2">
+            <a:schemeClr val="accent1">
+              <a:shade val="50000"/>
+            </a:schemeClr>
+          </a:lnRef>
+          <a:fillRef idx="1">
+            <a:schemeClr val="accent1"/>
+          </a:fillRef>
+          <a:effectRef idx="0">
+            <a:schemeClr val="accent1"/>
+          </a:effectRef>
+          <a:fontRef idx="minor">
+            <a:schemeClr val="lt1"/>
+          </a:fontRef>
+        </p:style>
+        <p:txBody>
+          <a:bodyPr rtlCol="0" anchor="ctr"/>
+          <a:lstStyle/>
+          <a:p>
+            <a:pPr algn="ctr"/>
+            <a:r>
+              <a:rPr lang="nl-NL" dirty="0" err="1" smtClean="0"/>
+              <a:t>eb:store</a:t>
+            </a:r>
+            <a:endParaRPr lang="nl-NL" dirty="0"/>
+          </a:p>
+        </p:txBody>
+      </p:sp>
+      <p:sp>
+        <p:nvSpPr>
+          <p:cNvPr id="32" name="Afgeronde rechthoek 31"/>
+          <p:cNvSpPr/>
+          <p:nvPr/>
+        </p:nvSpPr>
+        <p:spPr>
+          <a:xfrm>
+            <a:off x="1157775" y="1988840"/>
+            <a:ext cx="1815989" cy="360040"/>
+          </a:xfrm>
+          <a:prstGeom prst="roundRect">
+            <a:avLst/>
+          </a:prstGeom>
+        </p:spPr>
+        <p:style>
+          <a:lnRef idx="2">
+            <a:schemeClr val="accent1">
+              <a:shade val="50000"/>
+            </a:schemeClr>
+          </a:lnRef>
+          <a:fillRef idx="1">
+            <a:schemeClr val="accent1"/>
+          </a:fillRef>
+          <a:effectRef idx="0">
+            <a:schemeClr val="accent1"/>
+          </a:effectRef>
+          <a:fontRef idx="minor">
+            <a:schemeClr val="lt1"/>
+          </a:fontRef>
+        </p:style>
+        <p:txBody>
+          <a:bodyPr rtlCol="0" anchor="ctr"/>
+          <a:lstStyle/>
+          <a:p>
+            <a:pPr algn="ctr"/>
+            <a:r>
+              <a:rPr lang="nl-NL" dirty="0" err="1" smtClean="0"/>
+              <a:t>eb:hierarchy</a:t>
             </a:r>
             <a:endParaRPr lang="nl-NL" dirty="0"/>
           </a:p>
@@ -5356,7 +5351,7 @@
     </p:spTree>
     <p:extLst>
       <p:ext uri="{BB962C8B-B14F-4D97-AF65-F5344CB8AC3E}">
-        <p14:creationId xmlns:p14="http://schemas.microsoft.com/office/powerpoint/2010/main" val="3474427813"/>
+        <p14:creationId xmlns:p14="http://schemas.microsoft.com/office/powerpoint/2010/main" val="252493339"/>
       </p:ext>
     </p:extLst>
   </p:cSld>
@@ -5392,14 +5387,14 @@
       </p:grpSpPr>
       <p:sp>
         <p:nvSpPr>
-          <p:cNvPr id="11" name="Afgeronde rechthoek 10"/>
+          <p:cNvPr id="4" name="Afgeronde rechthoek 3"/>
           <p:cNvSpPr/>
           <p:nvPr/>
         </p:nvSpPr>
         <p:spPr>
           <a:xfrm>
-            <a:off x="539552" y="260647"/>
-            <a:ext cx="3032720" cy="6480721"/>
+            <a:off x="497393" y="4005064"/>
+            <a:ext cx="2016225" cy="2088232"/>
           </a:xfrm>
           <a:prstGeom prst="roundRect">
             <a:avLst>
@@ -5451,8 +5446,8 @@
           <a:lstStyle/>
           <a:p>
             <a:r>
-              <a:rPr lang="nl-NL" dirty="0" err="1" smtClean="0"/>
-              <a:t>eb:main</a:t>
+              <a:rPr lang="nl-NL" dirty="0" smtClean="0"/>
+              <a:t>TEI</a:t>
             </a:r>
             <a:endParaRPr lang="nl-NL" dirty="0"/>
           </a:p>
@@ -5460,14 +5455,14 @@
       </p:sp>
       <p:sp>
         <p:nvSpPr>
-          <p:cNvPr id="5" name="Afgeronde rechthoek 4"/>
+          <p:cNvPr id="6" name="Afgeronde rechthoek 5"/>
           <p:cNvSpPr/>
           <p:nvPr/>
         </p:nvSpPr>
         <p:spPr>
           <a:xfrm>
-            <a:off x="1147917" y="980728"/>
-            <a:ext cx="1815989" cy="360040"/>
+            <a:off x="941750" y="5301208"/>
+            <a:ext cx="1109970" cy="360040"/>
           </a:xfrm>
           <a:prstGeom prst="roundRect">
             <a:avLst/>
@@ -5495,8 +5490,8 @@
           <a:p>
             <a:pPr algn="ctr"/>
             <a:r>
-              <a:rPr lang="nl-NL" dirty="0" err="1" smtClean="0"/>
-              <a:t>eb:compose</a:t>
+              <a:rPr lang="nl-NL" dirty="0" smtClean="0"/>
+              <a:t>body</a:t>
             </a:r>
             <a:endParaRPr lang="nl-NL" dirty="0"/>
           </a:p>
@@ -5504,326 +5499,14 @@
       </p:sp>
       <p:sp>
         <p:nvSpPr>
-          <p:cNvPr id="7" name="Afgeronde rechthoek 6"/>
+          <p:cNvPr id="16" name="Afgeronde rechthoek 15"/>
           <p:cNvSpPr/>
           <p:nvPr/>
         </p:nvSpPr>
         <p:spPr>
           <a:xfrm>
-            <a:off x="1157775" y="1484784"/>
-            <a:ext cx="1815989" cy="360040"/>
-          </a:xfrm>
-          <a:prstGeom prst="roundRect">
-            <a:avLst/>
-          </a:prstGeom>
-        </p:spPr>
-        <p:style>
-          <a:lnRef idx="2">
-            <a:schemeClr val="accent1">
-              <a:shade val="50000"/>
-            </a:schemeClr>
-          </a:lnRef>
-          <a:fillRef idx="1">
-            <a:schemeClr val="accent1"/>
-          </a:fillRef>
-          <a:effectRef idx="0">
-            <a:schemeClr val="accent1"/>
-          </a:effectRef>
-          <a:fontRef idx="minor">
-            <a:schemeClr val="lt1"/>
-          </a:fontRef>
-        </p:style>
-        <p:txBody>
-          <a:bodyPr rtlCol="0" anchor="ctr"/>
-          <a:lstStyle/>
-          <a:p>
-            <a:pPr algn="ctr"/>
-            <a:r>
-              <a:rPr lang="nl-NL" dirty="0" err="1" smtClean="0"/>
-              <a:t>eb:mark-specials</a:t>
-            </a:r>
-            <a:endParaRPr lang="nl-NL" dirty="0"/>
-          </a:p>
-        </p:txBody>
-      </p:sp>
-      <p:sp>
-        <p:nvSpPr>
-          <p:cNvPr id="8" name="Afgeronde rechthoek 7"/>
-          <p:cNvSpPr/>
-          <p:nvPr/>
-        </p:nvSpPr>
-        <p:spPr>
-          <a:xfrm>
-            <a:off x="1157775" y="4509120"/>
-            <a:ext cx="1815989" cy="360040"/>
-          </a:xfrm>
-          <a:prstGeom prst="roundRect">
-            <a:avLst/>
-          </a:prstGeom>
-        </p:spPr>
-        <p:style>
-          <a:lnRef idx="2">
-            <a:schemeClr val="accent1">
-              <a:shade val="50000"/>
-            </a:schemeClr>
-          </a:lnRef>
-          <a:fillRef idx="1">
-            <a:schemeClr val="accent1"/>
-          </a:fillRef>
-          <a:effectRef idx="0">
-            <a:schemeClr val="accent1"/>
-          </a:effectRef>
-          <a:fontRef idx="minor">
-            <a:schemeClr val="lt1"/>
-          </a:fontRef>
-        </p:style>
-        <p:txBody>
-          <a:bodyPr rtlCol="0" anchor="ctr"/>
-          <a:lstStyle/>
-          <a:p>
-            <a:pPr algn="ctr"/>
-            <a:r>
-              <a:rPr lang="nl-NL" dirty="0" err="1"/>
-              <a:t>e</a:t>
-            </a:r>
-            <a:r>
-              <a:rPr lang="nl-NL" dirty="0" err="1" smtClean="0"/>
-              <a:t>b:insert-toc</a:t>
-            </a:r>
-            <a:endParaRPr lang="nl-NL" dirty="0"/>
-          </a:p>
-        </p:txBody>
-      </p:sp>
-      <p:sp>
-        <p:nvSpPr>
-          <p:cNvPr id="9" name="Afgeronde rechthoek 8"/>
-          <p:cNvSpPr/>
-          <p:nvPr/>
-        </p:nvSpPr>
-        <p:spPr>
-          <a:xfrm>
-            <a:off x="1157775" y="5013176"/>
-            <a:ext cx="1815989" cy="360040"/>
-          </a:xfrm>
-          <a:prstGeom prst="roundRect">
-            <a:avLst/>
-          </a:prstGeom>
-        </p:spPr>
-        <p:style>
-          <a:lnRef idx="2">
-            <a:schemeClr val="accent1">
-              <a:shade val="50000"/>
-            </a:schemeClr>
-          </a:lnRef>
-          <a:fillRef idx="1">
-            <a:schemeClr val="accent1"/>
-          </a:fillRef>
-          <a:effectRef idx="0">
-            <a:schemeClr val="accent1"/>
-          </a:effectRef>
-          <a:fontRef idx="minor">
-            <a:schemeClr val="lt1"/>
-          </a:fontRef>
-        </p:style>
-        <p:txBody>
-          <a:bodyPr rtlCol="0" anchor="ctr"/>
-          <a:lstStyle/>
-          <a:p>
-            <a:pPr algn="ctr"/>
-            <a:r>
-              <a:rPr lang="nl-NL" dirty="0" err="1" smtClean="0"/>
-              <a:t>eb:paginate</a:t>
-            </a:r>
-            <a:endParaRPr lang="nl-NL" dirty="0"/>
-          </a:p>
-        </p:txBody>
-      </p:sp>
-      <p:sp>
-        <p:nvSpPr>
-          <p:cNvPr id="10" name="Afgeronde rechthoek 9"/>
-          <p:cNvSpPr/>
-          <p:nvPr/>
-        </p:nvSpPr>
-        <p:spPr>
-          <a:xfrm>
-            <a:off x="1147917" y="5517232"/>
-            <a:ext cx="1815989" cy="360040"/>
-          </a:xfrm>
-          <a:prstGeom prst="roundRect">
-            <a:avLst/>
-          </a:prstGeom>
-        </p:spPr>
-        <p:style>
-          <a:lnRef idx="2">
-            <a:schemeClr val="accent1">
-              <a:shade val="50000"/>
-            </a:schemeClr>
-          </a:lnRef>
-          <a:fillRef idx="1">
-            <a:schemeClr val="accent1"/>
-          </a:fillRef>
-          <a:effectRef idx="0">
-            <a:schemeClr val="accent1"/>
-          </a:effectRef>
-          <a:fontRef idx="minor">
-            <a:schemeClr val="lt1"/>
-          </a:fontRef>
-        </p:style>
-        <p:txBody>
-          <a:bodyPr rtlCol="0" anchor="ctr"/>
-          <a:lstStyle/>
-          <a:p>
-            <a:pPr algn="ctr"/>
-            <a:r>
-              <a:rPr lang="nl-NL" dirty="0" err="1" smtClean="0"/>
-              <a:t>eb:resolve-links</a:t>
-            </a:r>
-            <a:endParaRPr lang="nl-NL" dirty="0"/>
-          </a:p>
-        </p:txBody>
-      </p:sp>
-      <p:sp>
-        <p:nvSpPr>
-          <p:cNvPr id="12" name="Afgeronde rechthoek 11"/>
-          <p:cNvSpPr/>
-          <p:nvPr/>
-        </p:nvSpPr>
-        <p:spPr>
-          <a:xfrm>
-            <a:off x="1157775" y="2989308"/>
-            <a:ext cx="1815989" cy="360040"/>
-          </a:xfrm>
-          <a:prstGeom prst="roundRect">
-            <a:avLst/>
-          </a:prstGeom>
-        </p:spPr>
-        <p:style>
-          <a:lnRef idx="2">
-            <a:schemeClr val="accent1">
-              <a:shade val="50000"/>
-            </a:schemeClr>
-          </a:lnRef>
-          <a:fillRef idx="1">
-            <a:schemeClr val="accent1"/>
-          </a:fillRef>
-          <a:effectRef idx="0">
-            <a:schemeClr val="accent1"/>
-          </a:effectRef>
-          <a:fontRef idx="minor">
-            <a:schemeClr val="lt1"/>
-          </a:fontRef>
-        </p:style>
-        <p:txBody>
-          <a:bodyPr rtlCol="0" anchor="ctr"/>
-          <a:lstStyle/>
-          <a:p>
-            <a:pPr algn="ctr"/>
-            <a:r>
-              <a:rPr lang="nl-NL" dirty="0" err="1" smtClean="0"/>
-              <a:t>eb:insert-lof</a:t>
-            </a:r>
-            <a:endParaRPr lang="nl-NL" dirty="0"/>
-          </a:p>
-        </p:txBody>
-      </p:sp>
-      <p:sp>
-        <p:nvSpPr>
-          <p:cNvPr id="13" name="Afgeronde rechthoek 12"/>
-          <p:cNvSpPr/>
-          <p:nvPr/>
-        </p:nvSpPr>
-        <p:spPr>
-          <a:xfrm>
-            <a:off x="1157775" y="3494345"/>
-            <a:ext cx="1815989" cy="360040"/>
-          </a:xfrm>
-          <a:prstGeom prst="roundRect">
-            <a:avLst/>
-          </a:prstGeom>
-        </p:spPr>
-        <p:style>
-          <a:lnRef idx="2">
-            <a:schemeClr val="accent1">
-              <a:shade val="50000"/>
-            </a:schemeClr>
-          </a:lnRef>
-          <a:fillRef idx="1">
-            <a:schemeClr val="accent1"/>
-          </a:fillRef>
-          <a:effectRef idx="0">
-            <a:schemeClr val="accent1"/>
-          </a:effectRef>
-          <a:fontRef idx="minor">
-            <a:schemeClr val="lt1"/>
-          </a:fontRef>
-        </p:style>
-        <p:txBody>
-          <a:bodyPr rtlCol="0" anchor="ctr"/>
-          <a:lstStyle/>
-          <a:p>
-            <a:pPr algn="ctr"/>
-            <a:r>
-              <a:rPr lang="nl-NL" dirty="0" err="1" smtClean="0"/>
-              <a:t>eb:insert-lot</a:t>
-            </a:r>
-            <a:endParaRPr lang="nl-NL" dirty="0"/>
-          </a:p>
-        </p:txBody>
-      </p:sp>
-      <p:sp>
-        <p:nvSpPr>
-          <p:cNvPr id="14" name="Afgeronde rechthoek 13"/>
-          <p:cNvSpPr/>
-          <p:nvPr/>
-        </p:nvSpPr>
-        <p:spPr>
-          <a:xfrm>
-            <a:off x="1157775" y="4005064"/>
-            <a:ext cx="1815989" cy="360040"/>
-          </a:xfrm>
-          <a:prstGeom prst="roundRect">
-            <a:avLst/>
-          </a:prstGeom>
-        </p:spPr>
-        <p:style>
-          <a:lnRef idx="2">
-            <a:schemeClr val="accent1">
-              <a:shade val="50000"/>
-            </a:schemeClr>
-          </a:lnRef>
-          <a:fillRef idx="1">
-            <a:schemeClr val="accent1"/>
-          </a:fillRef>
-          <a:effectRef idx="0">
-            <a:schemeClr val="accent1"/>
-          </a:effectRef>
-          <a:fontRef idx="minor">
-            <a:schemeClr val="lt1"/>
-          </a:fontRef>
-        </p:style>
-        <p:txBody>
-          <a:bodyPr rtlCol="0" anchor="ctr"/>
-          <a:lstStyle/>
-          <a:p>
-            <a:pPr algn="ctr"/>
-            <a:r>
-              <a:rPr lang="nl-NL" dirty="0" err="1" smtClean="0"/>
-              <a:t>eb:insert-index</a:t>
-            </a:r>
-            <a:endParaRPr lang="nl-NL" dirty="0"/>
-          </a:p>
-        </p:txBody>
-      </p:sp>
-      <p:sp>
-        <p:nvSpPr>
-          <p:cNvPr id="17" name="Afgeronde rechthoek 16"/>
-          <p:cNvSpPr/>
-          <p:nvPr/>
-        </p:nvSpPr>
-        <p:spPr>
-          <a:xfrm>
-            <a:off x="4518734" y="250035"/>
-            <a:ext cx="3888432" cy="6264696"/>
+            <a:off x="518472" y="476672"/>
+            <a:ext cx="2016225" cy="3024336"/>
           </a:xfrm>
           <a:prstGeom prst="roundRect">
             <a:avLst>
@@ -5876,7 +5559,19 @@
           <a:p>
             <a:r>
               <a:rPr lang="nl-NL" dirty="0" err="1" smtClean="0"/>
-              <a:t>epub:store</a:t>
+              <a:t>Customized</a:t>
+            </a:r>
+            <a:r>
+              <a:rPr lang="nl-NL" dirty="0"/>
+              <a:t> </a:t>
+            </a:r>
+            <a:r>
+              <a:rPr lang="nl-NL" dirty="0" err="1"/>
+              <a:t>l</a:t>
+            </a:r>
+            <a:r>
+              <a:rPr lang="nl-NL" dirty="0" err="1" smtClean="0"/>
+              <a:t>ayout</a:t>
             </a:r>
             <a:endParaRPr lang="nl-NL" dirty="0"/>
           </a:p>
@@ -5884,14 +5579,14 @@
       </p:sp>
       <p:sp>
         <p:nvSpPr>
-          <p:cNvPr id="18" name="Afgeronde rechthoek 17"/>
+          <p:cNvPr id="17" name="Afgeronde rechthoek 16"/>
           <p:cNvSpPr/>
           <p:nvPr/>
         </p:nvSpPr>
         <p:spPr>
           <a:xfrm>
-            <a:off x="5180365" y="1042123"/>
-            <a:ext cx="2550129" cy="360040"/>
+            <a:off x="941750" y="1268760"/>
+            <a:ext cx="1109970" cy="360040"/>
           </a:xfrm>
           <a:prstGeom prst="roundRect">
             <a:avLst/>
@@ -5920,7 +5615,7 @@
             <a:pPr algn="ctr"/>
             <a:r>
               <a:rPr lang="nl-NL" dirty="0" err="1" smtClean="0"/>
-              <a:t>epub:compose</a:t>
+              <a:t>metadata</a:t>
             </a:r>
             <a:endParaRPr lang="nl-NL" dirty="0"/>
           </a:p>
@@ -5928,14 +5623,14 @@
       </p:sp>
       <p:sp>
         <p:nvSpPr>
-          <p:cNvPr id="19" name="Afgeronde rechthoek 18"/>
+          <p:cNvPr id="18" name="Afgeronde rechthoek 17"/>
           <p:cNvSpPr/>
           <p:nvPr/>
         </p:nvSpPr>
         <p:spPr>
           <a:xfrm>
-            <a:off x="5190223" y="1546179"/>
-            <a:ext cx="2550129" cy="360040"/>
+            <a:off x="941750" y="1772816"/>
+            <a:ext cx="1109970" cy="360040"/>
           </a:xfrm>
           <a:prstGeom prst="roundRect">
             <a:avLst/>
@@ -5963,8 +5658,8 @@
           <a:p>
             <a:pPr algn="ctr"/>
             <a:r>
-              <a:rPr lang="nl-NL" dirty="0" err="1" smtClean="0"/>
-              <a:t>epub:store-mimetype</a:t>
+              <a:rPr lang="nl-NL" dirty="0" smtClean="0"/>
+              <a:t>front</a:t>
             </a:r>
             <a:endParaRPr lang="nl-NL" dirty="0"/>
           </a:p>
@@ -5972,14 +5667,14 @@
       </p:sp>
       <p:sp>
         <p:nvSpPr>
-          <p:cNvPr id="20" name="Afgeronde rechthoek 19"/>
+          <p:cNvPr id="19" name="Afgeronde rechthoek 18"/>
           <p:cNvSpPr/>
           <p:nvPr/>
         </p:nvSpPr>
         <p:spPr>
           <a:xfrm>
-            <a:off x="5190223" y="3562403"/>
-            <a:ext cx="2550129" cy="360040"/>
+            <a:off x="941750" y="2276872"/>
+            <a:ext cx="1109970" cy="360040"/>
           </a:xfrm>
           <a:prstGeom prst="roundRect">
             <a:avLst/>
@@ -6007,12 +5702,8 @@
           <a:p>
             <a:pPr algn="ctr"/>
             <a:r>
-              <a:rPr lang="nl-NL" dirty="0" err="1"/>
-              <a:t>e</a:t>
-            </a:r>
-            <a:r>
               <a:rPr lang="nl-NL" dirty="0" err="1" smtClean="0"/>
-              <a:t>pub:store-pages</a:t>
+              <a:t>main</a:t>
             </a:r>
             <a:endParaRPr lang="nl-NL" dirty="0"/>
           </a:p>
@@ -6020,14 +5711,14 @@
       </p:sp>
       <p:sp>
         <p:nvSpPr>
-          <p:cNvPr id="21" name="Afgeronde rechthoek 20"/>
+          <p:cNvPr id="20" name="Afgeronde rechthoek 19"/>
           <p:cNvSpPr/>
           <p:nvPr/>
         </p:nvSpPr>
         <p:spPr>
           <a:xfrm>
-            <a:off x="5190223" y="4066459"/>
-            <a:ext cx="2550129" cy="360040"/>
+            <a:off x="941750" y="2789312"/>
+            <a:ext cx="1109970" cy="360040"/>
           </a:xfrm>
           <a:prstGeom prst="roundRect">
             <a:avLst/>
@@ -6055,8 +5746,8 @@
           <a:p>
             <a:pPr algn="ctr"/>
             <a:r>
-              <a:rPr lang="nl-NL" dirty="0" err="1" smtClean="0"/>
-              <a:t>epub:copy-mages</a:t>
+              <a:rPr lang="nl-NL" dirty="0" smtClean="0"/>
+              <a:t>back</a:t>
             </a:r>
             <a:endParaRPr lang="nl-NL" dirty="0"/>
           </a:p>
@@ -6064,18 +5755,43 @@
       </p:sp>
       <p:sp>
         <p:nvSpPr>
-          <p:cNvPr id="22" name="Afgeronde rechthoek 21"/>
+          <p:cNvPr id="21" name="Afgeronde rechthoek 20"/>
           <p:cNvSpPr/>
           <p:nvPr/>
         </p:nvSpPr>
         <p:spPr>
           <a:xfrm>
-            <a:off x="5180365" y="4570515"/>
-            <a:ext cx="2550129" cy="360040"/>
+            <a:off x="6588224" y="476672"/>
+            <a:ext cx="2016225" cy="3024336"/>
           </a:xfrm>
           <a:prstGeom prst="roundRect">
-            <a:avLst/>
-          </a:prstGeom>
+            <a:avLst>
+              <a:gd name="adj" fmla="val 7300"/>
+            </a:avLst>
+          </a:prstGeom>
+          <a:gradFill>
+            <a:gsLst>
+              <a:gs pos="0">
+                <a:schemeClr val="accent1">
+                  <a:tint val="66000"/>
+                  <a:satMod val="160000"/>
+                </a:schemeClr>
+              </a:gs>
+              <a:gs pos="50000">
+                <a:schemeClr val="accent1">
+                  <a:tint val="44500"/>
+                  <a:satMod val="160000"/>
+                </a:schemeClr>
+              </a:gs>
+              <a:gs pos="100000">
+                <a:schemeClr val="accent1">
+                  <a:tint val="23500"/>
+                  <a:satMod val="160000"/>
+                </a:schemeClr>
+              </a:gs>
+            </a:gsLst>
+            <a:lin ang="5400000" scaled="0"/>
+          </a:gradFill>
         </p:spPr>
         <p:style>
           <a:lnRef idx="2">
@@ -6094,13 +5810,12 @@
           </a:fontRef>
         </p:style>
         <p:txBody>
-          <a:bodyPr rtlCol="0" anchor="ctr"/>
-          <a:lstStyle/>
-          <a:p>
-            <a:pPr algn="ctr"/>
-            <a:r>
-              <a:rPr lang="nl-NL" dirty="0" err="1" smtClean="0"/>
-              <a:t>epub:copy-styles</a:t>
+          <a:bodyPr rtlCol="0" anchor="t" anchorCtr="0"/>
+          <a:lstStyle/>
+          <a:p>
+            <a:r>
+              <a:rPr lang="nl-NL" dirty="0" smtClean="0"/>
+              <a:t>E-Book</a:t>
             </a:r>
             <a:endParaRPr lang="nl-NL" dirty="0"/>
           </a:p>
@@ -6108,14 +5823,14 @@
       </p:sp>
       <p:sp>
         <p:nvSpPr>
-          <p:cNvPr id="23" name="Afgeronde rechthoek 22"/>
+          <p:cNvPr id="22" name="Afgeronde rechthoek 21"/>
           <p:cNvSpPr/>
           <p:nvPr/>
         </p:nvSpPr>
         <p:spPr>
           <a:xfrm>
-            <a:off x="5190223" y="2050235"/>
-            <a:ext cx="2550129" cy="360040"/>
+            <a:off x="7020272" y="1268760"/>
+            <a:ext cx="1109970" cy="360040"/>
           </a:xfrm>
           <a:prstGeom prst="roundRect">
             <a:avLst/>
@@ -6144,7 +5859,7 @@
             <a:pPr algn="ctr"/>
             <a:r>
               <a:rPr lang="nl-NL" dirty="0" err="1" smtClean="0"/>
-              <a:t>epub:store-container</a:t>
+              <a:t>metadata</a:t>
             </a:r>
             <a:endParaRPr lang="nl-NL" dirty="0"/>
           </a:p>
@@ -6152,14 +5867,14 @@
       </p:sp>
       <p:sp>
         <p:nvSpPr>
-          <p:cNvPr id="24" name="Afgeronde rechthoek 23"/>
+          <p:cNvPr id="23" name="Afgeronde rechthoek 22"/>
           <p:cNvSpPr/>
           <p:nvPr/>
         </p:nvSpPr>
         <p:spPr>
           <a:xfrm>
-            <a:off x="5190223" y="2555272"/>
-            <a:ext cx="2550129" cy="360040"/>
+            <a:off x="7020272" y="1772816"/>
+            <a:ext cx="1109970" cy="360040"/>
           </a:xfrm>
           <a:prstGeom prst="roundRect">
             <a:avLst/>
@@ -6187,8 +5902,8 @@
           <a:p>
             <a:pPr algn="ctr"/>
             <a:r>
-              <a:rPr lang="nl-NL" dirty="0" err="1" smtClean="0"/>
-              <a:t>epub:store-manifest</a:t>
+              <a:rPr lang="nl-NL" dirty="0" smtClean="0"/>
+              <a:t>front</a:t>
             </a:r>
             <a:endParaRPr lang="nl-NL" dirty="0"/>
           </a:p>
@@ -6196,14 +5911,14 @@
       </p:sp>
       <p:sp>
         <p:nvSpPr>
-          <p:cNvPr id="25" name="Afgeronde rechthoek 24"/>
+          <p:cNvPr id="24" name="Afgeronde rechthoek 23"/>
           <p:cNvSpPr/>
           <p:nvPr/>
         </p:nvSpPr>
         <p:spPr>
           <a:xfrm>
-            <a:off x="5190223" y="3065991"/>
-            <a:ext cx="2550129" cy="360040"/>
+            <a:off x="7020272" y="2276872"/>
+            <a:ext cx="1109970" cy="360040"/>
           </a:xfrm>
           <a:prstGeom prst="roundRect">
             <a:avLst/>
@@ -6232,7 +5947,7 @@
             <a:pPr algn="ctr"/>
             <a:r>
               <a:rPr lang="nl-NL" dirty="0" err="1" smtClean="0"/>
-              <a:t>epub:store-navigation</a:t>
+              <a:t>main</a:t>
             </a:r>
             <a:endParaRPr lang="nl-NL" dirty="0"/>
           </a:p>
@@ -6240,14 +5955,14 @@
       </p:sp>
       <p:sp>
         <p:nvSpPr>
-          <p:cNvPr id="26" name="Afgeronde rechthoek 25"/>
+          <p:cNvPr id="25" name="Afgeronde rechthoek 24"/>
           <p:cNvSpPr/>
           <p:nvPr/>
         </p:nvSpPr>
         <p:spPr>
           <a:xfrm>
-            <a:off x="1147916" y="2485252"/>
-            <a:ext cx="1815989" cy="360040"/>
+            <a:off x="7020272" y="2789312"/>
+            <a:ext cx="1109970" cy="360040"/>
           </a:xfrm>
           <a:prstGeom prst="roundRect">
             <a:avLst/>
@@ -6275,23 +5990,512 @@
           <a:p>
             <a:pPr algn="ctr"/>
             <a:r>
-              <a:rPr lang="nl-NL" dirty="0" err="1" smtClean="0"/>
-              <a:t>eb:insert-notes</a:t>
+              <a:rPr lang="nl-NL" dirty="0" smtClean="0"/>
+              <a:t>back</a:t>
             </a:r>
             <a:endParaRPr lang="nl-NL" dirty="0"/>
           </a:p>
         </p:txBody>
       </p:sp>
-      <p:sp>
-        <p:nvSpPr>
-          <p:cNvPr id="27" name="Afgeronde rechthoek 26"/>
+      <p:cxnSp>
+        <p:nvCxnSpPr>
+          <p:cNvPr id="33" name="Rechte verbindingslijn met pijl 32"/>
+          <p:cNvCxnSpPr>
+            <a:stCxn id="17" idx="3"/>
+            <a:endCxn id="22" idx="1"/>
+          </p:cNvCxnSpPr>
+          <p:nvPr/>
+        </p:nvCxnSpPr>
+        <p:spPr>
+          <a:xfrm>
+            <a:off x="2051720" y="1448780"/>
+            <a:ext cx="4968552" cy="0"/>
+          </a:xfrm>
+          <a:prstGeom prst="straightConnector1">
+            <a:avLst/>
+          </a:prstGeom>
+          <a:ln w="19050">
+            <a:tailEnd type="arrow"/>
+          </a:ln>
+        </p:spPr>
+        <p:style>
+          <a:lnRef idx="1">
+            <a:schemeClr val="accent1"/>
+          </a:lnRef>
+          <a:fillRef idx="0">
+            <a:schemeClr val="accent1"/>
+          </a:fillRef>
+          <a:effectRef idx="0">
+            <a:schemeClr val="accent1"/>
+          </a:effectRef>
+          <a:fontRef idx="minor">
+            <a:schemeClr val="tx1"/>
+          </a:fontRef>
+        </p:style>
+      </p:cxnSp>
+      <p:cxnSp>
+        <p:nvCxnSpPr>
+          <p:cNvPr id="36" name="Rechte verbindingslijn met pijl 35"/>
+          <p:cNvCxnSpPr>
+            <a:stCxn id="18" idx="3"/>
+            <a:endCxn id="23" idx="1"/>
+          </p:cNvCxnSpPr>
+          <p:nvPr/>
+        </p:nvCxnSpPr>
+        <p:spPr>
+          <a:xfrm>
+            <a:off x="2051720" y="1952836"/>
+            <a:ext cx="4968552" cy="0"/>
+          </a:xfrm>
+          <a:prstGeom prst="straightConnector1">
+            <a:avLst/>
+          </a:prstGeom>
+          <a:ln w="19050">
+            <a:tailEnd type="arrow"/>
+          </a:ln>
+        </p:spPr>
+        <p:style>
+          <a:lnRef idx="1">
+            <a:schemeClr val="accent1"/>
+          </a:lnRef>
+          <a:fillRef idx="0">
+            <a:schemeClr val="accent1"/>
+          </a:fillRef>
+          <a:effectRef idx="0">
+            <a:schemeClr val="accent1"/>
+          </a:effectRef>
+          <a:fontRef idx="minor">
+            <a:schemeClr val="tx1"/>
+          </a:fontRef>
+        </p:style>
+      </p:cxnSp>
+      <p:cxnSp>
+        <p:nvCxnSpPr>
+          <p:cNvPr id="37" name="Rechte verbindingslijn met pijl 36"/>
+          <p:cNvCxnSpPr>
+            <a:stCxn id="19" idx="3"/>
+            <a:endCxn id="24" idx="1"/>
+          </p:cNvCxnSpPr>
+          <p:nvPr/>
+        </p:nvCxnSpPr>
+        <p:spPr>
+          <a:xfrm>
+            <a:off x="2051720" y="2456892"/>
+            <a:ext cx="4968552" cy="0"/>
+          </a:xfrm>
+          <a:prstGeom prst="straightConnector1">
+            <a:avLst/>
+          </a:prstGeom>
+          <a:ln w="19050">
+            <a:tailEnd type="arrow"/>
+          </a:ln>
+        </p:spPr>
+        <p:style>
+          <a:lnRef idx="1">
+            <a:schemeClr val="accent1"/>
+          </a:lnRef>
+          <a:fillRef idx="0">
+            <a:schemeClr val="accent1"/>
+          </a:fillRef>
+          <a:effectRef idx="0">
+            <a:schemeClr val="accent1"/>
+          </a:effectRef>
+          <a:fontRef idx="minor">
+            <a:schemeClr val="tx1"/>
+          </a:fontRef>
+        </p:style>
+      </p:cxnSp>
+      <p:cxnSp>
+        <p:nvCxnSpPr>
+          <p:cNvPr id="38" name="Rechte verbindingslijn met pijl 37"/>
+          <p:cNvCxnSpPr>
+            <a:stCxn id="20" idx="3"/>
+            <a:endCxn id="25" idx="1"/>
+          </p:cNvCxnSpPr>
+          <p:nvPr/>
+        </p:nvCxnSpPr>
+        <p:spPr>
+          <a:xfrm>
+            <a:off x="2051720" y="2969332"/>
+            <a:ext cx="4968552" cy="0"/>
+          </a:xfrm>
+          <a:prstGeom prst="straightConnector1">
+            <a:avLst/>
+          </a:prstGeom>
+          <a:ln w="19050">
+            <a:tailEnd type="arrow"/>
+          </a:ln>
+        </p:spPr>
+        <p:style>
+          <a:lnRef idx="1">
+            <a:schemeClr val="accent1"/>
+          </a:lnRef>
+          <a:fillRef idx="0">
+            <a:schemeClr val="accent1"/>
+          </a:fillRef>
+          <a:effectRef idx="0">
+            <a:schemeClr val="accent1"/>
+          </a:effectRef>
+          <a:fontRef idx="minor">
+            <a:schemeClr val="tx1"/>
+          </a:fontRef>
+        </p:style>
+      </p:cxnSp>
+      <p:cxnSp>
+        <p:nvCxnSpPr>
+          <p:cNvPr id="51" name="Rechte verbindingslijn met pijl 47"/>
+          <p:cNvCxnSpPr/>
+          <p:nvPr/>
+        </p:nvCxnSpPr>
+        <p:spPr>
+          <a:xfrm flipV="1">
+            <a:off x="1979712" y="1949380"/>
+            <a:ext cx="3227516" cy="3027792"/>
+          </a:xfrm>
+          <a:prstGeom prst="bentConnector2">
+            <a:avLst/>
+          </a:prstGeom>
+          <a:ln w="19050">
+            <a:tailEnd type="arrow"/>
+          </a:ln>
+        </p:spPr>
+        <p:style>
+          <a:lnRef idx="1">
+            <a:schemeClr val="accent1"/>
+          </a:lnRef>
+          <a:fillRef idx="0">
+            <a:schemeClr val="accent1"/>
+          </a:fillRef>
+          <a:effectRef idx="0">
+            <a:schemeClr val="accent1"/>
+          </a:effectRef>
+          <a:fontRef idx="minor">
+            <a:schemeClr val="tx1"/>
+          </a:fontRef>
+        </p:style>
+      </p:cxnSp>
+      <p:cxnSp>
+        <p:nvCxnSpPr>
+          <p:cNvPr id="55" name="Rechte verbindingslijn met pijl 47"/>
+          <p:cNvCxnSpPr/>
+          <p:nvPr/>
+        </p:nvCxnSpPr>
+        <p:spPr>
+          <a:xfrm flipV="1">
+            <a:off x="1979712" y="2471192"/>
+            <a:ext cx="3844026" cy="3010036"/>
+          </a:xfrm>
+          <a:prstGeom prst="bentConnector2">
+            <a:avLst/>
+          </a:prstGeom>
+          <a:ln w="19050">
+            <a:tailEnd type="arrow"/>
+          </a:ln>
+        </p:spPr>
+        <p:style>
+          <a:lnRef idx="1">
+            <a:schemeClr val="accent1"/>
+          </a:lnRef>
+          <a:fillRef idx="0">
+            <a:schemeClr val="accent1"/>
+          </a:fillRef>
+          <a:effectRef idx="0">
+            <a:schemeClr val="accent1"/>
+          </a:effectRef>
+          <a:fontRef idx="minor">
+            <a:schemeClr val="tx1"/>
+          </a:fontRef>
+        </p:style>
+      </p:cxnSp>
+      <p:sp>
+        <p:nvSpPr>
+          <p:cNvPr id="60" name="Tekstvak 59"/>
+          <p:cNvSpPr txBox="1"/>
+          <p:nvPr/>
+        </p:nvSpPr>
+        <p:spPr>
+          <a:xfrm>
+            <a:off x="3472210" y="4581128"/>
+            <a:ext cx="1027782" cy="276999"/>
+          </a:xfrm>
+          <a:prstGeom prst="rect">
+            <a:avLst/>
+          </a:prstGeom>
+          <a:noFill/>
+        </p:spPr>
+        <p:txBody>
+          <a:bodyPr wrap="none" rtlCol="0">
+            <a:spAutoFit/>
+          </a:bodyPr>
+          <a:lstStyle/>
+          <a:p>
+            <a:r>
+              <a:rPr lang="nl-NL" sz="1200" dirty="0" smtClean="0"/>
+              <a:t>get </a:t>
+            </a:r>
+            <a:r>
+              <a:rPr lang="nl-NL" sz="1200" dirty="0" err="1" smtClean="0"/>
+              <a:t>metadata</a:t>
+            </a:r>
+            <a:endParaRPr lang="nl-NL" sz="1200" dirty="0"/>
+          </a:p>
+        </p:txBody>
+      </p:sp>
+      <p:sp>
+        <p:nvSpPr>
+          <p:cNvPr id="61" name="Tekstvak 60"/>
+          <p:cNvSpPr txBox="1"/>
+          <p:nvPr/>
+        </p:nvSpPr>
+        <p:spPr>
+          <a:xfrm>
+            <a:off x="3563888" y="5013176"/>
+            <a:ext cx="1224631" cy="276999"/>
+          </a:xfrm>
+          <a:prstGeom prst="rect">
+            <a:avLst/>
+          </a:prstGeom>
+          <a:noFill/>
+        </p:spPr>
+        <p:txBody>
+          <a:bodyPr wrap="none" rtlCol="0">
+            <a:spAutoFit/>
+          </a:bodyPr>
+          <a:lstStyle/>
+          <a:p>
+            <a:r>
+              <a:rPr lang="nl-NL" sz="1200" dirty="0" smtClean="0"/>
+              <a:t>get front-matter</a:t>
+            </a:r>
+            <a:endParaRPr lang="nl-NL" sz="1200" dirty="0"/>
+          </a:p>
+        </p:txBody>
+      </p:sp>
+      <p:sp>
+        <p:nvSpPr>
+          <p:cNvPr id="62" name="Tekstvak 61"/>
+          <p:cNvSpPr txBox="1"/>
+          <p:nvPr/>
+        </p:nvSpPr>
+        <p:spPr>
+          <a:xfrm>
+            <a:off x="3703499" y="5481228"/>
+            <a:ext cx="1228541" cy="276999"/>
+          </a:xfrm>
+          <a:prstGeom prst="rect">
+            <a:avLst/>
+          </a:prstGeom>
+          <a:noFill/>
+        </p:spPr>
+        <p:txBody>
+          <a:bodyPr wrap="none" rtlCol="0">
+            <a:spAutoFit/>
+          </a:bodyPr>
+          <a:lstStyle/>
+          <a:p>
+            <a:r>
+              <a:rPr lang="nl-NL" sz="1200" dirty="0" smtClean="0"/>
+              <a:t>get </a:t>
+            </a:r>
+            <a:r>
+              <a:rPr lang="nl-NL" sz="1200" dirty="0" err="1" smtClean="0"/>
+              <a:t>main</a:t>
+            </a:r>
+            <a:r>
+              <a:rPr lang="nl-NL" sz="1200" dirty="0" smtClean="0"/>
+              <a:t>-matter</a:t>
+            </a:r>
+            <a:endParaRPr lang="nl-NL" sz="1200" dirty="0"/>
+          </a:p>
+        </p:txBody>
+      </p:sp>
+      <p:sp>
+        <p:nvSpPr>
+          <p:cNvPr id="63" name="Tekstvak 62"/>
+          <p:cNvSpPr txBox="1"/>
+          <p:nvPr/>
+        </p:nvSpPr>
+        <p:spPr>
+          <a:xfrm>
+            <a:off x="2572400" y="1162411"/>
+            <a:ext cx="1135504" cy="276999"/>
+          </a:xfrm>
+          <a:prstGeom prst="rect">
+            <a:avLst/>
+          </a:prstGeom>
+          <a:noFill/>
+        </p:spPr>
+        <p:txBody>
+          <a:bodyPr wrap="none" rtlCol="0">
+            <a:spAutoFit/>
+          </a:bodyPr>
+          <a:lstStyle/>
+          <a:p>
+            <a:r>
+              <a:rPr lang="nl-NL" sz="1200" dirty="0" smtClean="0"/>
+              <a:t>extra </a:t>
+            </a:r>
+            <a:r>
+              <a:rPr lang="nl-NL" sz="1200" dirty="0" err="1" smtClean="0"/>
+              <a:t>metadata</a:t>
+            </a:r>
+            <a:endParaRPr lang="nl-NL" sz="1200" dirty="0"/>
+          </a:p>
+        </p:txBody>
+      </p:sp>
+      <p:sp>
+        <p:nvSpPr>
+          <p:cNvPr id="79" name="Tekstvak 78"/>
+          <p:cNvSpPr txBox="1"/>
+          <p:nvPr/>
+        </p:nvSpPr>
+        <p:spPr>
+          <a:xfrm>
+            <a:off x="2699792" y="1672381"/>
+            <a:ext cx="789127" cy="276999"/>
+          </a:xfrm>
+          <a:prstGeom prst="rect">
+            <a:avLst/>
+          </a:prstGeom>
+          <a:noFill/>
+        </p:spPr>
+        <p:txBody>
+          <a:bodyPr wrap="none" rtlCol="0">
+            <a:spAutoFit/>
+          </a:bodyPr>
+          <a:lstStyle/>
+          <a:p>
+            <a:r>
+              <a:rPr lang="nl-NL" sz="1200" dirty="0" err="1" smtClean="0"/>
+              <a:t>insert</a:t>
+            </a:r>
+            <a:r>
+              <a:rPr lang="nl-NL" sz="1200" dirty="0" smtClean="0"/>
+              <a:t> </a:t>
+            </a:r>
+            <a:r>
+              <a:rPr lang="nl-NL" sz="1200" dirty="0" err="1" smtClean="0"/>
+              <a:t>toc</a:t>
+            </a:r>
+            <a:endParaRPr lang="nl-NL" sz="1200" dirty="0"/>
+          </a:p>
+        </p:txBody>
+      </p:sp>
+      <p:sp>
+        <p:nvSpPr>
+          <p:cNvPr id="80" name="Tekstvak 79"/>
+          <p:cNvSpPr txBox="1"/>
+          <p:nvPr/>
+        </p:nvSpPr>
+        <p:spPr>
+          <a:xfrm>
+            <a:off x="2987824" y="2692333"/>
+            <a:ext cx="1387944" cy="276999"/>
+          </a:xfrm>
+          <a:prstGeom prst="rect">
+            <a:avLst/>
+          </a:prstGeom>
+          <a:noFill/>
+        </p:spPr>
+        <p:txBody>
+          <a:bodyPr wrap="none" rtlCol="0">
+            <a:spAutoFit/>
+          </a:bodyPr>
+          <a:lstStyle/>
+          <a:p>
+            <a:r>
+              <a:rPr lang="nl-NL" sz="1200" dirty="0" err="1" smtClean="0"/>
+              <a:t>insert</a:t>
+            </a:r>
+            <a:r>
+              <a:rPr lang="nl-NL" sz="1200" dirty="0" smtClean="0"/>
+              <a:t> lof, lot, index</a:t>
+            </a:r>
+            <a:endParaRPr lang="nl-NL" sz="1200" dirty="0"/>
+          </a:p>
+        </p:txBody>
+      </p:sp>
+      <p:sp>
+        <p:nvSpPr>
+          <p:cNvPr id="81" name="Tekstvak 80"/>
+          <p:cNvSpPr txBox="1"/>
+          <p:nvPr/>
+        </p:nvSpPr>
+        <p:spPr>
+          <a:xfrm>
+            <a:off x="2849914" y="2179893"/>
+            <a:ext cx="929998" cy="276999"/>
+          </a:xfrm>
+          <a:prstGeom prst="rect">
+            <a:avLst/>
+          </a:prstGeom>
+          <a:noFill/>
+        </p:spPr>
+        <p:txBody>
+          <a:bodyPr wrap="none" rtlCol="0">
+            <a:spAutoFit/>
+          </a:bodyPr>
+          <a:lstStyle/>
+          <a:p>
+            <a:r>
+              <a:rPr lang="nl-NL" sz="1200" dirty="0" err="1" smtClean="0"/>
+              <a:t>insert</a:t>
+            </a:r>
+            <a:r>
+              <a:rPr lang="nl-NL" sz="1200" dirty="0" smtClean="0"/>
+              <a:t> </a:t>
+            </a:r>
+            <a:r>
+              <a:rPr lang="nl-NL" sz="1200" dirty="0" err="1" smtClean="0"/>
+              <a:t>notes</a:t>
+            </a:r>
+            <a:endParaRPr lang="nl-NL" sz="1200" dirty="0"/>
+          </a:p>
+        </p:txBody>
+      </p:sp>
+      <p:cxnSp>
+        <p:nvCxnSpPr>
+          <p:cNvPr id="86" name="Rechte verbindingslijn met pijl 47"/>
+          <p:cNvCxnSpPr/>
+          <p:nvPr/>
+        </p:nvCxnSpPr>
+        <p:spPr>
+          <a:xfrm flipV="1">
+            <a:off x="2051720" y="1448780"/>
+            <a:ext cx="2536782" cy="3420380"/>
+          </a:xfrm>
+          <a:prstGeom prst="bentConnector2">
+            <a:avLst/>
+          </a:prstGeom>
+          <a:ln w="19050">
+            <a:tailEnd type="arrow"/>
+          </a:ln>
+        </p:spPr>
+        <p:style>
+          <a:lnRef idx="1">
+            <a:schemeClr val="accent1"/>
+          </a:lnRef>
+          <a:fillRef idx="0">
+            <a:schemeClr val="accent1"/>
+          </a:fillRef>
+          <a:effectRef idx="0">
+            <a:schemeClr val="accent1"/>
+          </a:effectRef>
+          <a:fontRef idx="minor">
+            <a:schemeClr val="tx1"/>
+          </a:fontRef>
+        </p:style>
+      </p:cxnSp>
+      <p:sp>
+        <p:nvSpPr>
+          <p:cNvPr id="87" name="Afgeronde rechthoek 86"/>
           <p:cNvSpPr/>
           <p:nvPr/>
         </p:nvSpPr>
         <p:spPr>
           <a:xfrm>
-            <a:off x="5190223" y="5074571"/>
-            <a:ext cx="2550129" cy="360040"/>
+            <a:off x="941750" y="4725144"/>
+            <a:ext cx="1109970" cy="360040"/>
           </a:xfrm>
           <a:prstGeom prst="roundRect">
             <a:avLst/>
@@ -6320,211 +6524,7 @@
             <a:pPr algn="ctr"/>
             <a:r>
               <a:rPr lang="nl-NL" dirty="0" err="1" smtClean="0"/>
-              <a:t>epub:create-epub</a:t>
-            </a:r>
-            <a:endParaRPr lang="nl-NL" dirty="0"/>
-          </a:p>
-        </p:txBody>
-      </p:sp>
-      <p:sp>
-        <p:nvSpPr>
-          <p:cNvPr id="28" name="Afgeronde rechthoek 27"/>
-          <p:cNvSpPr/>
-          <p:nvPr/>
-        </p:nvSpPr>
-        <p:spPr>
-          <a:xfrm>
-            <a:off x="5190223" y="5578627"/>
-            <a:ext cx="2550129" cy="360040"/>
-          </a:xfrm>
-          <a:prstGeom prst="roundRect">
-            <a:avLst/>
-          </a:prstGeom>
-        </p:spPr>
-        <p:style>
-          <a:lnRef idx="2">
-            <a:schemeClr val="accent1">
-              <a:shade val="50000"/>
-            </a:schemeClr>
-          </a:lnRef>
-          <a:fillRef idx="1">
-            <a:schemeClr val="accent1"/>
-          </a:fillRef>
-          <a:effectRef idx="0">
-            <a:schemeClr val="accent1"/>
-          </a:effectRef>
-          <a:fontRef idx="minor">
-            <a:schemeClr val="lt1"/>
-          </a:fontRef>
-        </p:style>
-        <p:txBody>
-          <a:bodyPr rtlCol="0" anchor="ctr"/>
-          <a:lstStyle/>
-          <a:p>
-            <a:pPr algn="ctr"/>
-            <a:r>
-              <a:rPr lang="nl-NL" dirty="0" err="1" smtClean="0"/>
-              <a:t>epub:check-epub</a:t>
-            </a:r>
-            <a:endParaRPr lang="nl-NL" dirty="0"/>
-          </a:p>
-        </p:txBody>
-      </p:sp>
-      <p:cxnSp>
-        <p:nvCxnSpPr>
-          <p:cNvPr id="30" name="Rechte verbindingslijn met pijl 29"/>
-          <p:cNvCxnSpPr>
-            <a:stCxn id="11" idx="0"/>
-            <a:endCxn id="5" idx="0"/>
-          </p:cNvCxnSpPr>
-          <p:nvPr/>
-        </p:nvCxnSpPr>
-        <p:spPr>
-          <a:xfrm>
-            <a:off x="2055912" y="260647"/>
-            <a:ext cx="0" cy="720081"/>
-          </a:xfrm>
-          <a:prstGeom prst="straightConnector1">
-            <a:avLst/>
-          </a:prstGeom>
-          <a:ln w="19050">
-            <a:tailEnd type="arrow"/>
-          </a:ln>
-        </p:spPr>
-        <p:style>
-          <a:lnRef idx="1">
-            <a:schemeClr val="accent1"/>
-          </a:lnRef>
-          <a:fillRef idx="0">
-            <a:schemeClr val="accent1"/>
-          </a:fillRef>
-          <a:effectRef idx="0">
-            <a:schemeClr val="accent1"/>
-          </a:effectRef>
-          <a:fontRef idx="minor">
-            <a:schemeClr val="tx1"/>
-          </a:fontRef>
-        </p:style>
-      </p:cxnSp>
-      <p:cxnSp>
-        <p:nvCxnSpPr>
-          <p:cNvPr id="31" name="Rechte verbindingslijn met pijl 30"/>
-          <p:cNvCxnSpPr>
-            <a:stCxn id="17" idx="0"/>
-            <a:endCxn id="18" idx="0"/>
-          </p:cNvCxnSpPr>
-          <p:nvPr/>
-        </p:nvCxnSpPr>
-        <p:spPr>
-          <a:xfrm flipH="1">
-            <a:off x="6455430" y="250035"/>
-            <a:ext cx="7520" cy="792088"/>
-          </a:xfrm>
-          <a:prstGeom prst="straightConnector1">
-            <a:avLst/>
-          </a:prstGeom>
-          <a:ln w="19050">
-            <a:tailEnd type="arrow"/>
-          </a:ln>
-        </p:spPr>
-        <p:style>
-          <a:lnRef idx="1">
-            <a:schemeClr val="accent1"/>
-          </a:lnRef>
-          <a:fillRef idx="0">
-            <a:schemeClr val="accent1"/>
-          </a:fillRef>
-          <a:effectRef idx="0">
-            <a:schemeClr val="accent1"/>
-          </a:effectRef>
-          <a:fontRef idx="minor">
-            <a:schemeClr val="tx1"/>
-          </a:fontRef>
-        </p:style>
-      </p:cxnSp>
-      <p:sp>
-        <p:nvSpPr>
-          <p:cNvPr id="29" name="Afgeronde rechthoek 28"/>
-          <p:cNvSpPr/>
-          <p:nvPr/>
-        </p:nvSpPr>
-        <p:spPr>
-          <a:xfrm>
-            <a:off x="1157775" y="6021288"/>
-            <a:ext cx="1815989" cy="360040"/>
-          </a:xfrm>
-          <a:prstGeom prst="roundRect">
-            <a:avLst/>
-          </a:prstGeom>
-        </p:spPr>
-        <p:style>
-          <a:lnRef idx="2">
-            <a:schemeClr val="accent1">
-              <a:shade val="50000"/>
-            </a:schemeClr>
-          </a:lnRef>
-          <a:fillRef idx="1">
-            <a:schemeClr val="accent1"/>
-          </a:fillRef>
-          <a:effectRef idx="0">
-            <a:schemeClr val="accent1"/>
-          </a:effectRef>
-          <a:fontRef idx="minor">
-            <a:schemeClr val="lt1"/>
-          </a:fontRef>
-        </p:style>
-        <p:txBody>
-          <a:bodyPr rtlCol="0" anchor="ctr"/>
-          <a:lstStyle/>
-          <a:p>
-            <a:pPr algn="ctr"/>
-            <a:r>
-              <a:rPr lang="nl-NL" dirty="0" err="1" smtClean="0"/>
-              <a:t>eb:store</a:t>
-            </a:r>
-            <a:endParaRPr lang="nl-NL" dirty="0"/>
-          </a:p>
-        </p:txBody>
-      </p:sp>
-      <p:sp>
-        <p:nvSpPr>
-          <p:cNvPr id="32" name="Afgeronde rechthoek 31"/>
-          <p:cNvSpPr/>
-          <p:nvPr/>
-        </p:nvSpPr>
-        <p:spPr>
-          <a:xfrm>
-            <a:off x="1157775" y="1988840"/>
-            <a:ext cx="1815989" cy="360040"/>
-          </a:xfrm>
-          <a:prstGeom prst="roundRect">
-            <a:avLst/>
-          </a:prstGeom>
-        </p:spPr>
-        <p:style>
-          <a:lnRef idx="2">
-            <a:schemeClr val="accent1">
-              <a:shade val="50000"/>
-            </a:schemeClr>
-          </a:lnRef>
-          <a:fillRef idx="1">
-            <a:schemeClr val="accent1"/>
-          </a:fillRef>
-          <a:effectRef idx="0">
-            <a:schemeClr val="accent1"/>
-          </a:effectRef>
-          <a:fontRef idx="minor">
-            <a:schemeClr val="lt1"/>
-          </a:fontRef>
-        </p:style>
-        <p:txBody>
-          <a:bodyPr rtlCol="0" anchor="ctr"/>
-          <a:lstStyle/>
-          <a:p>
-            <a:pPr algn="ctr"/>
-            <a:r>
-              <a:rPr lang="nl-NL" dirty="0" err="1" smtClean="0"/>
-              <a:t>eb:hierarchy</a:t>
+              <a:t>TEIhead</a:t>
             </a:r>
             <a:endParaRPr lang="nl-NL" dirty="0"/>
           </a:p>
@@ -6533,7 +6533,7 @@
     </p:spTree>
     <p:extLst>
       <p:ext uri="{BB962C8B-B14F-4D97-AF65-F5344CB8AC3E}">
-        <p14:creationId xmlns:p14="http://schemas.microsoft.com/office/powerpoint/2010/main" val="252493339"/>
+        <p14:creationId xmlns:p14="http://schemas.microsoft.com/office/powerpoint/2010/main" val="2861489599"/>
       </p:ext>
     </p:extLst>
   </p:cSld>
@@ -6569,1188 +6569,6 @@
       </p:grpSpPr>
       <p:sp>
         <p:nvSpPr>
-          <p:cNvPr id="4" name="Afgeronde rechthoek 3"/>
-          <p:cNvSpPr/>
-          <p:nvPr/>
-        </p:nvSpPr>
-        <p:spPr>
-          <a:xfrm>
-            <a:off x="497393" y="4005064"/>
-            <a:ext cx="2016225" cy="2088232"/>
-          </a:xfrm>
-          <a:prstGeom prst="roundRect">
-            <a:avLst>
-              <a:gd name="adj" fmla="val 7300"/>
-            </a:avLst>
-          </a:prstGeom>
-          <a:gradFill>
-            <a:gsLst>
-              <a:gs pos="0">
-                <a:schemeClr val="accent1">
-                  <a:tint val="66000"/>
-                  <a:satMod val="160000"/>
-                </a:schemeClr>
-              </a:gs>
-              <a:gs pos="50000">
-                <a:schemeClr val="accent1">
-                  <a:tint val="44500"/>
-                  <a:satMod val="160000"/>
-                </a:schemeClr>
-              </a:gs>
-              <a:gs pos="100000">
-                <a:schemeClr val="accent1">
-                  <a:tint val="23500"/>
-                  <a:satMod val="160000"/>
-                </a:schemeClr>
-              </a:gs>
-            </a:gsLst>
-            <a:lin ang="5400000" scaled="0"/>
-          </a:gradFill>
-        </p:spPr>
-        <p:style>
-          <a:lnRef idx="2">
-            <a:schemeClr val="accent1">
-              <a:shade val="50000"/>
-            </a:schemeClr>
-          </a:lnRef>
-          <a:fillRef idx="1">
-            <a:schemeClr val="accent1"/>
-          </a:fillRef>
-          <a:effectRef idx="0">
-            <a:schemeClr val="accent1"/>
-          </a:effectRef>
-          <a:fontRef idx="minor">
-            <a:schemeClr val="lt1"/>
-          </a:fontRef>
-        </p:style>
-        <p:txBody>
-          <a:bodyPr rtlCol="0" anchor="t" anchorCtr="0"/>
-          <a:lstStyle/>
-          <a:p>
-            <a:r>
-              <a:rPr lang="nl-NL" dirty="0" smtClean="0"/>
-              <a:t>TEI</a:t>
-            </a:r>
-            <a:endParaRPr lang="nl-NL" dirty="0"/>
-          </a:p>
-        </p:txBody>
-      </p:sp>
-      <p:sp>
-        <p:nvSpPr>
-          <p:cNvPr id="6" name="Afgeronde rechthoek 5"/>
-          <p:cNvSpPr/>
-          <p:nvPr/>
-        </p:nvSpPr>
-        <p:spPr>
-          <a:xfrm>
-            <a:off x="941750" y="5301208"/>
-            <a:ext cx="1109970" cy="360040"/>
-          </a:xfrm>
-          <a:prstGeom prst="roundRect">
-            <a:avLst/>
-          </a:prstGeom>
-        </p:spPr>
-        <p:style>
-          <a:lnRef idx="2">
-            <a:schemeClr val="accent1">
-              <a:shade val="50000"/>
-            </a:schemeClr>
-          </a:lnRef>
-          <a:fillRef idx="1">
-            <a:schemeClr val="accent1"/>
-          </a:fillRef>
-          <a:effectRef idx="0">
-            <a:schemeClr val="accent1"/>
-          </a:effectRef>
-          <a:fontRef idx="minor">
-            <a:schemeClr val="lt1"/>
-          </a:fontRef>
-        </p:style>
-        <p:txBody>
-          <a:bodyPr rtlCol="0" anchor="ctr"/>
-          <a:lstStyle/>
-          <a:p>
-            <a:pPr algn="ctr"/>
-            <a:r>
-              <a:rPr lang="nl-NL" dirty="0" smtClean="0"/>
-              <a:t>body</a:t>
-            </a:r>
-            <a:endParaRPr lang="nl-NL" dirty="0"/>
-          </a:p>
-        </p:txBody>
-      </p:sp>
-      <p:sp>
-        <p:nvSpPr>
-          <p:cNvPr id="16" name="Afgeronde rechthoek 15"/>
-          <p:cNvSpPr/>
-          <p:nvPr/>
-        </p:nvSpPr>
-        <p:spPr>
-          <a:xfrm>
-            <a:off x="518472" y="476672"/>
-            <a:ext cx="2016225" cy="3024336"/>
-          </a:xfrm>
-          <a:prstGeom prst="roundRect">
-            <a:avLst>
-              <a:gd name="adj" fmla="val 7300"/>
-            </a:avLst>
-          </a:prstGeom>
-          <a:gradFill>
-            <a:gsLst>
-              <a:gs pos="0">
-                <a:schemeClr val="accent1">
-                  <a:tint val="66000"/>
-                  <a:satMod val="160000"/>
-                </a:schemeClr>
-              </a:gs>
-              <a:gs pos="50000">
-                <a:schemeClr val="accent1">
-                  <a:tint val="44500"/>
-                  <a:satMod val="160000"/>
-                </a:schemeClr>
-              </a:gs>
-              <a:gs pos="100000">
-                <a:schemeClr val="accent1">
-                  <a:tint val="23500"/>
-                  <a:satMod val="160000"/>
-                </a:schemeClr>
-              </a:gs>
-            </a:gsLst>
-            <a:lin ang="5400000" scaled="0"/>
-          </a:gradFill>
-        </p:spPr>
-        <p:style>
-          <a:lnRef idx="2">
-            <a:schemeClr val="accent1">
-              <a:shade val="50000"/>
-            </a:schemeClr>
-          </a:lnRef>
-          <a:fillRef idx="1">
-            <a:schemeClr val="accent1"/>
-          </a:fillRef>
-          <a:effectRef idx="0">
-            <a:schemeClr val="accent1"/>
-          </a:effectRef>
-          <a:fontRef idx="minor">
-            <a:schemeClr val="lt1"/>
-          </a:fontRef>
-        </p:style>
-        <p:txBody>
-          <a:bodyPr rtlCol="0" anchor="t" anchorCtr="0"/>
-          <a:lstStyle/>
-          <a:p>
-            <a:r>
-              <a:rPr lang="nl-NL" dirty="0" err="1" smtClean="0"/>
-              <a:t>Customized</a:t>
-            </a:r>
-            <a:r>
-              <a:rPr lang="nl-NL" dirty="0"/>
-              <a:t> </a:t>
-            </a:r>
-            <a:r>
-              <a:rPr lang="nl-NL" dirty="0" err="1"/>
-              <a:t>l</a:t>
-            </a:r>
-            <a:r>
-              <a:rPr lang="nl-NL" dirty="0" err="1" smtClean="0"/>
-              <a:t>ayout</a:t>
-            </a:r>
-            <a:endParaRPr lang="nl-NL" dirty="0"/>
-          </a:p>
-        </p:txBody>
-      </p:sp>
-      <p:sp>
-        <p:nvSpPr>
-          <p:cNvPr id="17" name="Afgeronde rechthoek 16"/>
-          <p:cNvSpPr/>
-          <p:nvPr/>
-        </p:nvSpPr>
-        <p:spPr>
-          <a:xfrm>
-            <a:off x="941750" y="1268760"/>
-            <a:ext cx="1109970" cy="360040"/>
-          </a:xfrm>
-          <a:prstGeom prst="roundRect">
-            <a:avLst/>
-          </a:prstGeom>
-        </p:spPr>
-        <p:style>
-          <a:lnRef idx="2">
-            <a:schemeClr val="accent1">
-              <a:shade val="50000"/>
-            </a:schemeClr>
-          </a:lnRef>
-          <a:fillRef idx="1">
-            <a:schemeClr val="accent1"/>
-          </a:fillRef>
-          <a:effectRef idx="0">
-            <a:schemeClr val="accent1"/>
-          </a:effectRef>
-          <a:fontRef idx="minor">
-            <a:schemeClr val="lt1"/>
-          </a:fontRef>
-        </p:style>
-        <p:txBody>
-          <a:bodyPr rtlCol="0" anchor="ctr"/>
-          <a:lstStyle/>
-          <a:p>
-            <a:pPr algn="ctr"/>
-            <a:r>
-              <a:rPr lang="nl-NL" dirty="0" err="1" smtClean="0"/>
-              <a:t>metadata</a:t>
-            </a:r>
-            <a:endParaRPr lang="nl-NL" dirty="0"/>
-          </a:p>
-        </p:txBody>
-      </p:sp>
-      <p:sp>
-        <p:nvSpPr>
-          <p:cNvPr id="18" name="Afgeronde rechthoek 17"/>
-          <p:cNvSpPr/>
-          <p:nvPr/>
-        </p:nvSpPr>
-        <p:spPr>
-          <a:xfrm>
-            <a:off x="941750" y="1772816"/>
-            <a:ext cx="1109970" cy="360040"/>
-          </a:xfrm>
-          <a:prstGeom prst="roundRect">
-            <a:avLst/>
-          </a:prstGeom>
-        </p:spPr>
-        <p:style>
-          <a:lnRef idx="2">
-            <a:schemeClr val="accent1">
-              <a:shade val="50000"/>
-            </a:schemeClr>
-          </a:lnRef>
-          <a:fillRef idx="1">
-            <a:schemeClr val="accent1"/>
-          </a:fillRef>
-          <a:effectRef idx="0">
-            <a:schemeClr val="accent1"/>
-          </a:effectRef>
-          <a:fontRef idx="minor">
-            <a:schemeClr val="lt1"/>
-          </a:fontRef>
-        </p:style>
-        <p:txBody>
-          <a:bodyPr rtlCol="0" anchor="ctr"/>
-          <a:lstStyle/>
-          <a:p>
-            <a:pPr algn="ctr"/>
-            <a:r>
-              <a:rPr lang="nl-NL" dirty="0" smtClean="0"/>
-              <a:t>front</a:t>
-            </a:r>
-            <a:endParaRPr lang="nl-NL" dirty="0"/>
-          </a:p>
-        </p:txBody>
-      </p:sp>
-      <p:sp>
-        <p:nvSpPr>
-          <p:cNvPr id="19" name="Afgeronde rechthoek 18"/>
-          <p:cNvSpPr/>
-          <p:nvPr/>
-        </p:nvSpPr>
-        <p:spPr>
-          <a:xfrm>
-            <a:off x="941750" y="2276872"/>
-            <a:ext cx="1109970" cy="360040"/>
-          </a:xfrm>
-          <a:prstGeom prst="roundRect">
-            <a:avLst/>
-          </a:prstGeom>
-        </p:spPr>
-        <p:style>
-          <a:lnRef idx="2">
-            <a:schemeClr val="accent1">
-              <a:shade val="50000"/>
-            </a:schemeClr>
-          </a:lnRef>
-          <a:fillRef idx="1">
-            <a:schemeClr val="accent1"/>
-          </a:fillRef>
-          <a:effectRef idx="0">
-            <a:schemeClr val="accent1"/>
-          </a:effectRef>
-          <a:fontRef idx="minor">
-            <a:schemeClr val="lt1"/>
-          </a:fontRef>
-        </p:style>
-        <p:txBody>
-          <a:bodyPr rtlCol="0" anchor="ctr"/>
-          <a:lstStyle/>
-          <a:p>
-            <a:pPr algn="ctr"/>
-            <a:r>
-              <a:rPr lang="nl-NL" dirty="0" err="1" smtClean="0"/>
-              <a:t>main</a:t>
-            </a:r>
-            <a:endParaRPr lang="nl-NL" dirty="0"/>
-          </a:p>
-        </p:txBody>
-      </p:sp>
-      <p:sp>
-        <p:nvSpPr>
-          <p:cNvPr id="20" name="Afgeronde rechthoek 19"/>
-          <p:cNvSpPr/>
-          <p:nvPr/>
-        </p:nvSpPr>
-        <p:spPr>
-          <a:xfrm>
-            <a:off x="941750" y="2789312"/>
-            <a:ext cx="1109970" cy="360040"/>
-          </a:xfrm>
-          <a:prstGeom prst="roundRect">
-            <a:avLst/>
-          </a:prstGeom>
-        </p:spPr>
-        <p:style>
-          <a:lnRef idx="2">
-            <a:schemeClr val="accent1">
-              <a:shade val="50000"/>
-            </a:schemeClr>
-          </a:lnRef>
-          <a:fillRef idx="1">
-            <a:schemeClr val="accent1"/>
-          </a:fillRef>
-          <a:effectRef idx="0">
-            <a:schemeClr val="accent1"/>
-          </a:effectRef>
-          <a:fontRef idx="minor">
-            <a:schemeClr val="lt1"/>
-          </a:fontRef>
-        </p:style>
-        <p:txBody>
-          <a:bodyPr rtlCol="0" anchor="ctr"/>
-          <a:lstStyle/>
-          <a:p>
-            <a:pPr algn="ctr"/>
-            <a:r>
-              <a:rPr lang="nl-NL" dirty="0" smtClean="0"/>
-              <a:t>back</a:t>
-            </a:r>
-            <a:endParaRPr lang="nl-NL" dirty="0"/>
-          </a:p>
-        </p:txBody>
-      </p:sp>
-      <p:sp>
-        <p:nvSpPr>
-          <p:cNvPr id="21" name="Afgeronde rechthoek 20"/>
-          <p:cNvSpPr/>
-          <p:nvPr/>
-        </p:nvSpPr>
-        <p:spPr>
-          <a:xfrm>
-            <a:off x="6588224" y="476672"/>
-            <a:ext cx="2016225" cy="3024336"/>
-          </a:xfrm>
-          <a:prstGeom prst="roundRect">
-            <a:avLst>
-              <a:gd name="adj" fmla="val 7300"/>
-            </a:avLst>
-          </a:prstGeom>
-          <a:gradFill>
-            <a:gsLst>
-              <a:gs pos="0">
-                <a:schemeClr val="accent1">
-                  <a:tint val="66000"/>
-                  <a:satMod val="160000"/>
-                </a:schemeClr>
-              </a:gs>
-              <a:gs pos="50000">
-                <a:schemeClr val="accent1">
-                  <a:tint val="44500"/>
-                  <a:satMod val="160000"/>
-                </a:schemeClr>
-              </a:gs>
-              <a:gs pos="100000">
-                <a:schemeClr val="accent1">
-                  <a:tint val="23500"/>
-                  <a:satMod val="160000"/>
-                </a:schemeClr>
-              </a:gs>
-            </a:gsLst>
-            <a:lin ang="5400000" scaled="0"/>
-          </a:gradFill>
-        </p:spPr>
-        <p:style>
-          <a:lnRef idx="2">
-            <a:schemeClr val="accent1">
-              <a:shade val="50000"/>
-            </a:schemeClr>
-          </a:lnRef>
-          <a:fillRef idx="1">
-            <a:schemeClr val="accent1"/>
-          </a:fillRef>
-          <a:effectRef idx="0">
-            <a:schemeClr val="accent1"/>
-          </a:effectRef>
-          <a:fontRef idx="minor">
-            <a:schemeClr val="lt1"/>
-          </a:fontRef>
-        </p:style>
-        <p:txBody>
-          <a:bodyPr rtlCol="0" anchor="t" anchorCtr="0"/>
-          <a:lstStyle/>
-          <a:p>
-            <a:r>
-              <a:rPr lang="nl-NL" dirty="0" smtClean="0"/>
-              <a:t>E-Book</a:t>
-            </a:r>
-            <a:endParaRPr lang="nl-NL" dirty="0"/>
-          </a:p>
-        </p:txBody>
-      </p:sp>
-      <p:sp>
-        <p:nvSpPr>
-          <p:cNvPr id="22" name="Afgeronde rechthoek 21"/>
-          <p:cNvSpPr/>
-          <p:nvPr/>
-        </p:nvSpPr>
-        <p:spPr>
-          <a:xfrm>
-            <a:off x="7020272" y="1268760"/>
-            <a:ext cx="1109970" cy="360040"/>
-          </a:xfrm>
-          <a:prstGeom prst="roundRect">
-            <a:avLst/>
-          </a:prstGeom>
-        </p:spPr>
-        <p:style>
-          <a:lnRef idx="2">
-            <a:schemeClr val="accent1">
-              <a:shade val="50000"/>
-            </a:schemeClr>
-          </a:lnRef>
-          <a:fillRef idx="1">
-            <a:schemeClr val="accent1"/>
-          </a:fillRef>
-          <a:effectRef idx="0">
-            <a:schemeClr val="accent1"/>
-          </a:effectRef>
-          <a:fontRef idx="minor">
-            <a:schemeClr val="lt1"/>
-          </a:fontRef>
-        </p:style>
-        <p:txBody>
-          <a:bodyPr rtlCol="0" anchor="ctr"/>
-          <a:lstStyle/>
-          <a:p>
-            <a:pPr algn="ctr"/>
-            <a:r>
-              <a:rPr lang="nl-NL" dirty="0" err="1" smtClean="0"/>
-              <a:t>metadata</a:t>
-            </a:r>
-            <a:endParaRPr lang="nl-NL" dirty="0"/>
-          </a:p>
-        </p:txBody>
-      </p:sp>
-      <p:sp>
-        <p:nvSpPr>
-          <p:cNvPr id="23" name="Afgeronde rechthoek 22"/>
-          <p:cNvSpPr/>
-          <p:nvPr/>
-        </p:nvSpPr>
-        <p:spPr>
-          <a:xfrm>
-            <a:off x="7020272" y="1772816"/>
-            <a:ext cx="1109970" cy="360040"/>
-          </a:xfrm>
-          <a:prstGeom prst="roundRect">
-            <a:avLst/>
-          </a:prstGeom>
-        </p:spPr>
-        <p:style>
-          <a:lnRef idx="2">
-            <a:schemeClr val="accent1">
-              <a:shade val="50000"/>
-            </a:schemeClr>
-          </a:lnRef>
-          <a:fillRef idx="1">
-            <a:schemeClr val="accent1"/>
-          </a:fillRef>
-          <a:effectRef idx="0">
-            <a:schemeClr val="accent1"/>
-          </a:effectRef>
-          <a:fontRef idx="minor">
-            <a:schemeClr val="lt1"/>
-          </a:fontRef>
-        </p:style>
-        <p:txBody>
-          <a:bodyPr rtlCol="0" anchor="ctr"/>
-          <a:lstStyle/>
-          <a:p>
-            <a:pPr algn="ctr"/>
-            <a:r>
-              <a:rPr lang="nl-NL" dirty="0" smtClean="0"/>
-              <a:t>front</a:t>
-            </a:r>
-            <a:endParaRPr lang="nl-NL" dirty="0"/>
-          </a:p>
-        </p:txBody>
-      </p:sp>
-      <p:sp>
-        <p:nvSpPr>
-          <p:cNvPr id="24" name="Afgeronde rechthoek 23"/>
-          <p:cNvSpPr/>
-          <p:nvPr/>
-        </p:nvSpPr>
-        <p:spPr>
-          <a:xfrm>
-            <a:off x="7020272" y="2276872"/>
-            <a:ext cx="1109970" cy="360040"/>
-          </a:xfrm>
-          <a:prstGeom prst="roundRect">
-            <a:avLst/>
-          </a:prstGeom>
-        </p:spPr>
-        <p:style>
-          <a:lnRef idx="2">
-            <a:schemeClr val="accent1">
-              <a:shade val="50000"/>
-            </a:schemeClr>
-          </a:lnRef>
-          <a:fillRef idx="1">
-            <a:schemeClr val="accent1"/>
-          </a:fillRef>
-          <a:effectRef idx="0">
-            <a:schemeClr val="accent1"/>
-          </a:effectRef>
-          <a:fontRef idx="minor">
-            <a:schemeClr val="lt1"/>
-          </a:fontRef>
-        </p:style>
-        <p:txBody>
-          <a:bodyPr rtlCol="0" anchor="ctr"/>
-          <a:lstStyle/>
-          <a:p>
-            <a:pPr algn="ctr"/>
-            <a:r>
-              <a:rPr lang="nl-NL" dirty="0" err="1" smtClean="0"/>
-              <a:t>main</a:t>
-            </a:r>
-            <a:endParaRPr lang="nl-NL" dirty="0"/>
-          </a:p>
-        </p:txBody>
-      </p:sp>
-      <p:sp>
-        <p:nvSpPr>
-          <p:cNvPr id="25" name="Afgeronde rechthoek 24"/>
-          <p:cNvSpPr/>
-          <p:nvPr/>
-        </p:nvSpPr>
-        <p:spPr>
-          <a:xfrm>
-            <a:off x="7020272" y="2789312"/>
-            <a:ext cx="1109970" cy="360040"/>
-          </a:xfrm>
-          <a:prstGeom prst="roundRect">
-            <a:avLst/>
-          </a:prstGeom>
-        </p:spPr>
-        <p:style>
-          <a:lnRef idx="2">
-            <a:schemeClr val="accent1">
-              <a:shade val="50000"/>
-            </a:schemeClr>
-          </a:lnRef>
-          <a:fillRef idx="1">
-            <a:schemeClr val="accent1"/>
-          </a:fillRef>
-          <a:effectRef idx="0">
-            <a:schemeClr val="accent1"/>
-          </a:effectRef>
-          <a:fontRef idx="minor">
-            <a:schemeClr val="lt1"/>
-          </a:fontRef>
-        </p:style>
-        <p:txBody>
-          <a:bodyPr rtlCol="0" anchor="ctr"/>
-          <a:lstStyle/>
-          <a:p>
-            <a:pPr algn="ctr"/>
-            <a:r>
-              <a:rPr lang="nl-NL" dirty="0" smtClean="0"/>
-              <a:t>back</a:t>
-            </a:r>
-            <a:endParaRPr lang="nl-NL" dirty="0"/>
-          </a:p>
-        </p:txBody>
-      </p:sp>
-      <p:cxnSp>
-        <p:nvCxnSpPr>
-          <p:cNvPr id="33" name="Rechte verbindingslijn met pijl 32"/>
-          <p:cNvCxnSpPr>
-            <a:stCxn id="17" idx="3"/>
-            <a:endCxn id="22" idx="1"/>
-          </p:cNvCxnSpPr>
-          <p:nvPr/>
-        </p:nvCxnSpPr>
-        <p:spPr>
-          <a:xfrm>
-            <a:off x="2051720" y="1448780"/>
-            <a:ext cx="4968552" cy="0"/>
-          </a:xfrm>
-          <a:prstGeom prst="straightConnector1">
-            <a:avLst/>
-          </a:prstGeom>
-          <a:ln w="19050">
-            <a:tailEnd type="arrow"/>
-          </a:ln>
-        </p:spPr>
-        <p:style>
-          <a:lnRef idx="1">
-            <a:schemeClr val="accent1"/>
-          </a:lnRef>
-          <a:fillRef idx="0">
-            <a:schemeClr val="accent1"/>
-          </a:fillRef>
-          <a:effectRef idx="0">
-            <a:schemeClr val="accent1"/>
-          </a:effectRef>
-          <a:fontRef idx="minor">
-            <a:schemeClr val="tx1"/>
-          </a:fontRef>
-        </p:style>
-      </p:cxnSp>
-      <p:cxnSp>
-        <p:nvCxnSpPr>
-          <p:cNvPr id="36" name="Rechte verbindingslijn met pijl 35"/>
-          <p:cNvCxnSpPr>
-            <a:stCxn id="18" idx="3"/>
-            <a:endCxn id="23" idx="1"/>
-          </p:cNvCxnSpPr>
-          <p:nvPr/>
-        </p:nvCxnSpPr>
-        <p:spPr>
-          <a:xfrm>
-            <a:off x="2051720" y="1952836"/>
-            <a:ext cx="4968552" cy="0"/>
-          </a:xfrm>
-          <a:prstGeom prst="straightConnector1">
-            <a:avLst/>
-          </a:prstGeom>
-          <a:ln w="19050">
-            <a:tailEnd type="arrow"/>
-          </a:ln>
-        </p:spPr>
-        <p:style>
-          <a:lnRef idx="1">
-            <a:schemeClr val="accent1"/>
-          </a:lnRef>
-          <a:fillRef idx="0">
-            <a:schemeClr val="accent1"/>
-          </a:fillRef>
-          <a:effectRef idx="0">
-            <a:schemeClr val="accent1"/>
-          </a:effectRef>
-          <a:fontRef idx="minor">
-            <a:schemeClr val="tx1"/>
-          </a:fontRef>
-        </p:style>
-      </p:cxnSp>
-      <p:cxnSp>
-        <p:nvCxnSpPr>
-          <p:cNvPr id="37" name="Rechte verbindingslijn met pijl 36"/>
-          <p:cNvCxnSpPr>
-            <a:stCxn id="19" idx="3"/>
-            <a:endCxn id="24" idx="1"/>
-          </p:cNvCxnSpPr>
-          <p:nvPr/>
-        </p:nvCxnSpPr>
-        <p:spPr>
-          <a:xfrm>
-            <a:off x="2051720" y="2456892"/>
-            <a:ext cx="4968552" cy="0"/>
-          </a:xfrm>
-          <a:prstGeom prst="straightConnector1">
-            <a:avLst/>
-          </a:prstGeom>
-          <a:ln w="19050">
-            <a:tailEnd type="arrow"/>
-          </a:ln>
-        </p:spPr>
-        <p:style>
-          <a:lnRef idx="1">
-            <a:schemeClr val="accent1"/>
-          </a:lnRef>
-          <a:fillRef idx="0">
-            <a:schemeClr val="accent1"/>
-          </a:fillRef>
-          <a:effectRef idx="0">
-            <a:schemeClr val="accent1"/>
-          </a:effectRef>
-          <a:fontRef idx="minor">
-            <a:schemeClr val="tx1"/>
-          </a:fontRef>
-        </p:style>
-      </p:cxnSp>
-      <p:cxnSp>
-        <p:nvCxnSpPr>
-          <p:cNvPr id="38" name="Rechte verbindingslijn met pijl 37"/>
-          <p:cNvCxnSpPr>
-            <a:stCxn id="20" idx="3"/>
-            <a:endCxn id="25" idx="1"/>
-          </p:cNvCxnSpPr>
-          <p:nvPr/>
-        </p:nvCxnSpPr>
-        <p:spPr>
-          <a:xfrm>
-            <a:off x="2051720" y="2969332"/>
-            <a:ext cx="4968552" cy="0"/>
-          </a:xfrm>
-          <a:prstGeom prst="straightConnector1">
-            <a:avLst/>
-          </a:prstGeom>
-          <a:ln w="19050">
-            <a:tailEnd type="arrow"/>
-          </a:ln>
-        </p:spPr>
-        <p:style>
-          <a:lnRef idx="1">
-            <a:schemeClr val="accent1"/>
-          </a:lnRef>
-          <a:fillRef idx="0">
-            <a:schemeClr val="accent1"/>
-          </a:fillRef>
-          <a:effectRef idx="0">
-            <a:schemeClr val="accent1"/>
-          </a:effectRef>
-          <a:fontRef idx="minor">
-            <a:schemeClr val="tx1"/>
-          </a:fontRef>
-        </p:style>
-      </p:cxnSp>
-      <p:cxnSp>
-        <p:nvCxnSpPr>
-          <p:cNvPr id="51" name="Rechte verbindingslijn met pijl 47"/>
-          <p:cNvCxnSpPr/>
-          <p:nvPr/>
-        </p:nvCxnSpPr>
-        <p:spPr>
-          <a:xfrm flipV="1">
-            <a:off x="1979712" y="1949380"/>
-            <a:ext cx="3227516" cy="3027792"/>
-          </a:xfrm>
-          <a:prstGeom prst="bentConnector2">
-            <a:avLst/>
-          </a:prstGeom>
-          <a:ln w="19050">
-            <a:tailEnd type="arrow"/>
-          </a:ln>
-        </p:spPr>
-        <p:style>
-          <a:lnRef idx="1">
-            <a:schemeClr val="accent1"/>
-          </a:lnRef>
-          <a:fillRef idx="0">
-            <a:schemeClr val="accent1"/>
-          </a:fillRef>
-          <a:effectRef idx="0">
-            <a:schemeClr val="accent1"/>
-          </a:effectRef>
-          <a:fontRef idx="minor">
-            <a:schemeClr val="tx1"/>
-          </a:fontRef>
-        </p:style>
-      </p:cxnSp>
-      <p:cxnSp>
-        <p:nvCxnSpPr>
-          <p:cNvPr id="55" name="Rechte verbindingslijn met pijl 47"/>
-          <p:cNvCxnSpPr/>
-          <p:nvPr/>
-        </p:nvCxnSpPr>
-        <p:spPr>
-          <a:xfrm flipV="1">
-            <a:off x="1979712" y="2471192"/>
-            <a:ext cx="3844026" cy="3010036"/>
-          </a:xfrm>
-          <a:prstGeom prst="bentConnector2">
-            <a:avLst/>
-          </a:prstGeom>
-          <a:ln w="19050">
-            <a:tailEnd type="arrow"/>
-          </a:ln>
-        </p:spPr>
-        <p:style>
-          <a:lnRef idx="1">
-            <a:schemeClr val="accent1"/>
-          </a:lnRef>
-          <a:fillRef idx="0">
-            <a:schemeClr val="accent1"/>
-          </a:fillRef>
-          <a:effectRef idx="0">
-            <a:schemeClr val="accent1"/>
-          </a:effectRef>
-          <a:fontRef idx="minor">
-            <a:schemeClr val="tx1"/>
-          </a:fontRef>
-        </p:style>
-      </p:cxnSp>
-      <p:sp>
-        <p:nvSpPr>
-          <p:cNvPr id="60" name="Tekstvak 59"/>
-          <p:cNvSpPr txBox="1"/>
-          <p:nvPr/>
-        </p:nvSpPr>
-        <p:spPr>
-          <a:xfrm>
-            <a:off x="3472210" y="4581128"/>
-            <a:ext cx="1027782" cy="276999"/>
-          </a:xfrm>
-          <a:prstGeom prst="rect">
-            <a:avLst/>
-          </a:prstGeom>
-          <a:noFill/>
-        </p:spPr>
-        <p:txBody>
-          <a:bodyPr wrap="none" rtlCol="0">
-            <a:spAutoFit/>
-          </a:bodyPr>
-          <a:lstStyle/>
-          <a:p>
-            <a:r>
-              <a:rPr lang="nl-NL" sz="1200" dirty="0" smtClean="0"/>
-              <a:t>get </a:t>
-            </a:r>
-            <a:r>
-              <a:rPr lang="nl-NL" sz="1200" dirty="0" err="1" smtClean="0"/>
-              <a:t>metadata</a:t>
-            </a:r>
-            <a:endParaRPr lang="nl-NL" sz="1200" dirty="0"/>
-          </a:p>
-        </p:txBody>
-      </p:sp>
-      <p:sp>
-        <p:nvSpPr>
-          <p:cNvPr id="61" name="Tekstvak 60"/>
-          <p:cNvSpPr txBox="1"/>
-          <p:nvPr/>
-        </p:nvSpPr>
-        <p:spPr>
-          <a:xfrm>
-            <a:off x="3563888" y="5013176"/>
-            <a:ext cx="1224631" cy="276999"/>
-          </a:xfrm>
-          <a:prstGeom prst="rect">
-            <a:avLst/>
-          </a:prstGeom>
-          <a:noFill/>
-        </p:spPr>
-        <p:txBody>
-          <a:bodyPr wrap="none" rtlCol="0">
-            <a:spAutoFit/>
-          </a:bodyPr>
-          <a:lstStyle/>
-          <a:p>
-            <a:r>
-              <a:rPr lang="nl-NL" sz="1200" dirty="0" smtClean="0"/>
-              <a:t>get front-matter</a:t>
-            </a:r>
-            <a:endParaRPr lang="nl-NL" sz="1200" dirty="0"/>
-          </a:p>
-        </p:txBody>
-      </p:sp>
-      <p:sp>
-        <p:nvSpPr>
-          <p:cNvPr id="62" name="Tekstvak 61"/>
-          <p:cNvSpPr txBox="1"/>
-          <p:nvPr/>
-        </p:nvSpPr>
-        <p:spPr>
-          <a:xfrm>
-            <a:off x="3703499" y="5481228"/>
-            <a:ext cx="1228541" cy="276999"/>
-          </a:xfrm>
-          <a:prstGeom prst="rect">
-            <a:avLst/>
-          </a:prstGeom>
-          <a:noFill/>
-        </p:spPr>
-        <p:txBody>
-          <a:bodyPr wrap="none" rtlCol="0">
-            <a:spAutoFit/>
-          </a:bodyPr>
-          <a:lstStyle/>
-          <a:p>
-            <a:r>
-              <a:rPr lang="nl-NL" sz="1200" dirty="0" smtClean="0"/>
-              <a:t>get </a:t>
-            </a:r>
-            <a:r>
-              <a:rPr lang="nl-NL" sz="1200" dirty="0" err="1" smtClean="0"/>
-              <a:t>main</a:t>
-            </a:r>
-            <a:r>
-              <a:rPr lang="nl-NL" sz="1200" dirty="0" smtClean="0"/>
-              <a:t>-matter</a:t>
-            </a:r>
-            <a:endParaRPr lang="nl-NL" sz="1200" dirty="0"/>
-          </a:p>
-        </p:txBody>
-      </p:sp>
-      <p:sp>
-        <p:nvSpPr>
-          <p:cNvPr id="63" name="Tekstvak 62"/>
-          <p:cNvSpPr txBox="1"/>
-          <p:nvPr/>
-        </p:nvSpPr>
-        <p:spPr>
-          <a:xfrm>
-            <a:off x="2572400" y="1162411"/>
-            <a:ext cx="1135504" cy="276999"/>
-          </a:xfrm>
-          <a:prstGeom prst="rect">
-            <a:avLst/>
-          </a:prstGeom>
-          <a:noFill/>
-        </p:spPr>
-        <p:txBody>
-          <a:bodyPr wrap="none" rtlCol="0">
-            <a:spAutoFit/>
-          </a:bodyPr>
-          <a:lstStyle/>
-          <a:p>
-            <a:r>
-              <a:rPr lang="nl-NL" sz="1200" dirty="0" smtClean="0"/>
-              <a:t>extra </a:t>
-            </a:r>
-            <a:r>
-              <a:rPr lang="nl-NL" sz="1200" dirty="0" err="1" smtClean="0"/>
-              <a:t>metadata</a:t>
-            </a:r>
-            <a:endParaRPr lang="nl-NL" sz="1200" dirty="0"/>
-          </a:p>
-        </p:txBody>
-      </p:sp>
-      <p:sp>
-        <p:nvSpPr>
-          <p:cNvPr id="79" name="Tekstvak 78"/>
-          <p:cNvSpPr txBox="1"/>
-          <p:nvPr/>
-        </p:nvSpPr>
-        <p:spPr>
-          <a:xfrm>
-            <a:off x="2699792" y="1672381"/>
-            <a:ext cx="789127" cy="276999"/>
-          </a:xfrm>
-          <a:prstGeom prst="rect">
-            <a:avLst/>
-          </a:prstGeom>
-          <a:noFill/>
-        </p:spPr>
-        <p:txBody>
-          <a:bodyPr wrap="none" rtlCol="0">
-            <a:spAutoFit/>
-          </a:bodyPr>
-          <a:lstStyle/>
-          <a:p>
-            <a:r>
-              <a:rPr lang="nl-NL" sz="1200" dirty="0" err="1" smtClean="0"/>
-              <a:t>insert</a:t>
-            </a:r>
-            <a:r>
-              <a:rPr lang="nl-NL" sz="1200" dirty="0" smtClean="0"/>
-              <a:t> </a:t>
-            </a:r>
-            <a:r>
-              <a:rPr lang="nl-NL" sz="1200" dirty="0" err="1" smtClean="0"/>
-              <a:t>toc</a:t>
-            </a:r>
-            <a:endParaRPr lang="nl-NL" sz="1200" dirty="0"/>
-          </a:p>
-        </p:txBody>
-      </p:sp>
-      <p:sp>
-        <p:nvSpPr>
-          <p:cNvPr id="80" name="Tekstvak 79"/>
-          <p:cNvSpPr txBox="1"/>
-          <p:nvPr/>
-        </p:nvSpPr>
-        <p:spPr>
-          <a:xfrm>
-            <a:off x="2987824" y="2692333"/>
-            <a:ext cx="1387944" cy="276999"/>
-          </a:xfrm>
-          <a:prstGeom prst="rect">
-            <a:avLst/>
-          </a:prstGeom>
-          <a:noFill/>
-        </p:spPr>
-        <p:txBody>
-          <a:bodyPr wrap="none" rtlCol="0">
-            <a:spAutoFit/>
-          </a:bodyPr>
-          <a:lstStyle/>
-          <a:p>
-            <a:r>
-              <a:rPr lang="nl-NL" sz="1200" dirty="0" err="1" smtClean="0"/>
-              <a:t>insert</a:t>
-            </a:r>
-            <a:r>
-              <a:rPr lang="nl-NL" sz="1200" dirty="0" smtClean="0"/>
-              <a:t> lof, lot, index</a:t>
-            </a:r>
-            <a:endParaRPr lang="nl-NL" sz="1200" dirty="0"/>
-          </a:p>
-        </p:txBody>
-      </p:sp>
-      <p:sp>
-        <p:nvSpPr>
-          <p:cNvPr id="81" name="Tekstvak 80"/>
-          <p:cNvSpPr txBox="1"/>
-          <p:nvPr/>
-        </p:nvSpPr>
-        <p:spPr>
-          <a:xfrm>
-            <a:off x="2849914" y="2179893"/>
-            <a:ext cx="929998" cy="276999"/>
-          </a:xfrm>
-          <a:prstGeom prst="rect">
-            <a:avLst/>
-          </a:prstGeom>
-          <a:noFill/>
-        </p:spPr>
-        <p:txBody>
-          <a:bodyPr wrap="none" rtlCol="0">
-            <a:spAutoFit/>
-          </a:bodyPr>
-          <a:lstStyle/>
-          <a:p>
-            <a:r>
-              <a:rPr lang="nl-NL" sz="1200" dirty="0" err="1" smtClean="0"/>
-              <a:t>insert</a:t>
-            </a:r>
-            <a:r>
-              <a:rPr lang="nl-NL" sz="1200" dirty="0" smtClean="0"/>
-              <a:t> </a:t>
-            </a:r>
-            <a:r>
-              <a:rPr lang="nl-NL" sz="1200" dirty="0" err="1" smtClean="0"/>
-              <a:t>notes</a:t>
-            </a:r>
-            <a:endParaRPr lang="nl-NL" sz="1200" dirty="0"/>
-          </a:p>
-        </p:txBody>
-      </p:sp>
-      <p:cxnSp>
-        <p:nvCxnSpPr>
-          <p:cNvPr id="86" name="Rechte verbindingslijn met pijl 47"/>
-          <p:cNvCxnSpPr/>
-          <p:nvPr/>
-        </p:nvCxnSpPr>
-        <p:spPr>
-          <a:xfrm flipV="1">
-            <a:off x="2051720" y="1448780"/>
-            <a:ext cx="2536782" cy="3420380"/>
-          </a:xfrm>
-          <a:prstGeom prst="bentConnector2">
-            <a:avLst/>
-          </a:prstGeom>
-          <a:ln w="19050">
-            <a:tailEnd type="arrow"/>
-          </a:ln>
-        </p:spPr>
-        <p:style>
-          <a:lnRef idx="1">
-            <a:schemeClr val="accent1"/>
-          </a:lnRef>
-          <a:fillRef idx="0">
-            <a:schemeClr val="accent1"/>
-          </a:fillRef>
-          <a:effectRef idx="0">
-            <a:schemeClr val="accent1"/>
-          </a:effectRef>
-          <a:fontRef idx="minor">
-            <a:schemeClr val="tx1"/>
-          </a:fontRef>
-        </p:style>
-      </p:cxnSp>
-      <p:sp>
-        <p:nvSpPr>
-          <p:cNvPr id="87" name="Afgeronde rechthoek 86"/>
-          <p:cNvSpPr/>
-          <p:nvPr/>
-        </p:nvSpPr>
-        <p:spPr>
-          <a:xfrm>
-            <a:off x="941750" y="4725144"/>
-            <a:ext cx="1109970" cy="360040"/>
-          </a:xfrm>
-          <a:prstGeom prst="roundRect">
-            <a:avLst/>
-          </a:prstGeom>
-        </p:spPr>
-        <p:style>
-          <a:lnRef idx="2">
-            <a:schemeClr val="accent1">
-              <a:shade val="50000"/>
-            </a:schemeClr>
-          </a:lnRef>
-          <a:fillRef idx="1">
-            <a:schemeClr val="accent1"/>
-          </a:fillRef>
-          <a:effectRef idx="0">
-            <a:schemeClr val="accent1"/>
-          </a:effectRef>
-          <a:fontRef idx="minor">
-            <a:schemeClr val="lt1"/>
-          </a:fontRef>
-        </p:style>
-        <p:txBody>
-          <a:bodyPr rtlCol="0" anchor="ctr"/>
-          <a:lstStyle/>
-          <a:p>
-            <a:pPr algn="ctr"/>
-            <a:r>
-              <a:rPr lang="nl-NL" dirty="0" err="1" smtClean="0"/>
-              <a:t>TEIhead</a:t>
-            </a:r>
-            <a:endParaRPr lang="nl-NL" dirty="0"/>
-          </a:p>
-        </p:txBody>
-      </p:sp>
-    </p:spTree>
-    <p:extLst>
-      <p:ext uri="{BB962C8B-B14F-4D97-AF65-F5344CB8AC3E}">
-        <p14:creationId xmlns:p14="http://schemas.microsoft.com/office/powerpoint/2010/main" val="2861489599"/>
-      </p:ext>
-    </p:extLst>
-  </p:cSld>
-  <p:clrMapOvr>
-    <a:masterClrMapping/>
-  </p:clrMapOvr>
-  <p:timing>
-    <p:tnLst>
-      <p:par>
-        <p:cTn id="1" dur="indefinite" restart="never" nodeType="tmRoot"/>
-      </p:par>
-    </p:tnLst>
-  </p:timing>
-</p:sld>
-</file>
-
-<file path=ppt/slides/slide6.xml><?xml version="1.0" encoding="utf-8"?>
-<p:sld xmlns:a="http://schemas.openxmlformats.org/drawingml/2006/main" xmlns:r="http://schemas.openxmlformats.org/officeDocument/2006/relationships" xmlns:p="http://schemas.openxmlformats.org/presentationml/2006/main">
-  <p:cSld>
-    <p:spTree>
-      <p:nvGrpSpPr>
-        <p:cNvPr id="1" name=""/>
-        <p:cNvGrpSpPr/>
-        <p:nvPr/>
-      </p:nvGrpSpPr>
-      <p:grpSpPr>
-        <a:xfrm>
-          <a:off x="0" y="0"/>
-          <a:ext cx="0" cy="0"/>
-          <a:chOff x="0" y="0"/>
-          <a:chExt cx="0" cy="0"/>
-        </a:xfrm>
-      </p:grpSpPr>
-      <p:sp>
-        <p:nvSpPr>
           <p:cNvPr id="50" name="Afgeronde rechthoek 49"/>
           <p:cNvSpPr/>
           <p:nvPr/>
@@ -9048,401 +7866,6 @@
     <p:extLst>
       <p:ext uri="{BB962C8B-B14F-4D97-AF65-F5344CB8AC3E}">
         <p14:creationId xmlns:p14="http://schemas.microsoft.com/office/powerpoint/2010/main" val="3969824999"/>
-      </p:ext>
-    </p:extLst>
-  </p:cSld>
-  <p:clrMapOvr>
-    <a:masterClrMapping/>
-  </p:clrMapOvr>
-  <p:timing>
-    <p:tnLst>
-      <p:par>
-        <p:cTn id="1" dur="indefinite" restart="never" nodeType="tmRoot"/>
-      </p:par>
-    </p:tnLst>
-  </p:timing>
-</p:sld>
-</file>
-
-<file path=ppt/slides/slide7.xml><?xml version="1.0" encoding="utf-8"?>
-<p:sld xmlns:a="http://schemas.openxmlformats.org/drawingml/2006/main" xmlns:r="http://schemas.openxmlformats.org/officeDocument/2006/relationships" xmlns:p="http://schemas.openxmlformats.org/presentationml/2006/main">
-  <p:cSld>
-    <p:spTree>
-      <p:nvGrpSpPr>
-        <p:cNvPr id="1" name=""/>
-        <p:cNvGrpSpPr/>
-        <p:nvPr/>
-      </p:nvGrpSpPr>
-      <p:grpSpPr>
-        <a:xfrm>
-          <a:off x="0" y="0"/>
-          <a:ext cx="0" cy="0"/>
-          <a:chOff x="0" y="0"/>
-          <a:chExt cx="0" cy="0"/>
-        </a:xfrm>
-      </p:grpSpPr>
-      <p:sp>
-        <p:nvSpPr>
-          <p:cNvPr id="4" name="Afgeronde rechthoek 3"/>
-          <p:cNvSpPr/>
-          <p:nvPr/>
-        </p:nvSpPr>
-        <p:spPr>
-          <a:xfrm>
-            <a:off x="497393" y="4005064"/>
-            <a:ext cx="2016225" cy="2088232"/>
-          </a:xfrm>
-          <a:prstGeom prst="roundRect">
-            <a:avLst>
-              <a:gd name="adj" fmla="val 7300"/>
-            </a:avLst>
-          </a:prstGeom>
-          <a:gradFill>
-            <a:gsLst>
-              <a:gs pos="0">
-                <a:schemeClr val="accent1">
-                  <a:tint val="66000"/>
-                  <a:satMod val="160000"/>
-                </a:schemeClr>
-              </a:gs>
-              <a:gs pos="50000">
-                <a:schemeClr val="accent1">
-                  <a:tint val="44500"/>
-                  <a:satMod val="160000"/>
-                </a:schemeClr>
-              </a:gs>
-              <a:gs pos="100000">
-                <a:schemeClr val="accent1">
-                  <a:tint val="23500"/>
-                  <a:satMod val="160000"/>
-                </a:schemeClr>
-              </a:gs>
-            </a:gsLst>
-            <a:lin ang="5400000" scaled="0"/>
-          </a:gradFill>
-        </p:spPr>
-        <p:style>
-          <a:lnRef idx="2">
-            <a:schemeClr val="accent1">
-              <a:shade val="50000"/>
-            </a:schemeClr>
-          </a:lnRef>
-          <a:fillRef idx="1">
-            <a:schemeClr val="accent1"/>
-          </a:fillRef>
-          <a:effectRef idx="0">
-            <a:schemeClr val="accent1"/>
-          </a:effectRef>
-          <a:fontRef idx="minor">
-            <a:schemeClr val="lt1"/>
-          </a:fontRef>
-        </p:style>
-        <p:txBody>
-          <a:bodyPr rtlCol="0" anchor="t" anchorCtr="0"/>
-          <a:lstStyle/>
-          <a:p>
-            <a:r>
-              <a:rPr lang="nl-NL" dirty="0" smtClean="0"/>
-              <a:t>TEI</a:t>
-            </a:r>
-            <a:endParaRPr lang="nl-NL" dirty="0"/>
-          </a:p>
-        </p:txBody>
-      </p:sp>
-      <p:sp>
-        <p:nvSpPr>
-          <p:cNvPr id="5" name="Afgeronde rechthoek 4"/>
-          <p:cNvSpPr/>
-          <p:nvPr/>
-        </p:nvSpPr>
-        <p:spPr>
-          <a:xfrm>
-            <a:off x="3419872" y="836712"/>
-            <a:ext cx="1109970" cy="360040"/>
-          </a:xfrm>
-          <a:prstGeom prst="roundRect">
-            <a:avLst/>
-          </a:prstGeom>
-        </p:spPr>
-        <p:style>
-          <a:lnRef idx="2">
-            <a:schemeClr val="accent1">
-              <a:shade val="50000"/>
-            </a:schemeClr>
-          </a:lnRef>
-          <a:fillRef idx="1">
-            <a:schemeClr val="accent1"/>
-          </a:fillRef>
-          <a:effectRef idx="0">
-            <a:schemeClr val="accent1"/>
-          </a:effectRef>
-          <a:fontRef idx="minor">
-            <a:schemeClr val="lt1"/>
-          </a:fontRef>
-        </p:style>
-        <p:txBody>
-          <a:bodyPr rtlCol="0" anchor="ctr"/>
-          <a:lstStyle/>
-          <a:p>
-            <a:pPr algn="ctr"/>
-            <a:r>
-              <a:rPr lang="nl-NL" dirty="0" smtClean="0"/>
-              <a:t>XHTML</a:t>
-            </a:r>
-            <a:endParaRPr lang="nl-NL" dirty="0"/>
-          </a:p>
-        </p:txBody>
-      </p:sp>
-      <p:sp>
-        <p:nvSpPr>
-          <p:cNvPr id="6" name="Afgeronde rechthoek 5"/>
-          <p:cNvSpPr/>
-          <p:nvPr/>
-        </p:nvSpPr>
-        <p:spPr>
-          <a:xfrm>
-            <a:off x="611560" y="836712"/>
-            <a:ext cx="1109970" cy="360040"/>
-          </a:xfrm>
-          <a:prstGeom prst="roundRect">
-            <a:avLst/>
-          </a:prstGeom>
-        </p:spPr>
-        <p:style>
-          <a:lnRef idx="2">
-            <a:schemeClr val="accent1">
-              <a:shade val="50000"/>
-            </a:schemeClr>
-          </a:lnRef>
-          <a:fillRef idx="1">
-            <a:schemeClr val="accent1"/>
-          </a:fillRef>
-          <a:effectRef idx="0">
-            <a:schemeClr val="accent1"/>
-          </a:effectRef>
-          <a:fontRef idx="minor">
-            <a:schemeClr val="lt1"/>
-          </a:fontRef>
-        </p:style>
-        <p:txBody>
-          <a:bodyPr rtlCol="0" anchor="ctr"/>
-          <a:lstStyle/>
-          <a:p>
-            <a:pPr algn="ctr"/>
-            <a:r>
-              <a:rPr lang="nl-NL" dirty="0" smtClean="0"/>
-              <a:t>TEI</a:t>
-            </a:r>
-            <a:endParaRPr lang="nl-NL" dirty="0"/>
-          </a:p>
-        </p:txBody>
-      </p:sp>
-      <p:cxnSp>
-        <p:nvCxnSpPr>
-          <p:cNvPr id="7" name="Rechte verbindingslijn met pijl 47"/>
-          <p:cNvCxnSpPr>
-            <a:stCxn id="6" idx="3"/>
-            <a:endCxn id="5" idx="1"/>
-          </p:cNvCxnSpPr>
-          <p:nvPr/>
-        </p:nvCxnSpPr>
-        <p:spPr>
-          <a:xfrm>
-            <a:off x="1721530" y="1016732"/>
-            <a:ext cx="1698342" cy="0"/>
-          </a:xfrm>
-          <a:prstGeom prst="straightConnector1">
-            <a:avLst/>
-          </a:prstGeom>
-          <a:ln w="19050">
-            <a:tailEnd type="arrow"/>
-          </a:ln>
-        </p:spPr>
-        <p:style>
-          <a:lnRef idx="1">
-            <a:schemeClr val="accent1"/>
-          </a:lnRef>
-          <a:fillRef idx="0">
-            <a:schemeClr val="accent1"/>
-          </a:fillRef>
-          <a:effectRef idx="0">
-            <a:schemeClr val="accent1"/>
-          </a:effectRef>
-          <a:fontRef idx="minor">
-            <a:schemeClr val="tx1"/>
-          </a:fontRef>
-        </p:style>
-      </p:cxnSp>
-      <p:sp>
-        <p:nvSpPr>
-          <p:cNvPr id="8" name="Afgeronde rechthoek 7"/>
-          <p:cNvSpPr/>
-          <p:nvPr/>
-        </p:nvSpPr>
-        <p:spPr>
-          <a:xfrm>
-            <a:off x="3419872" y="1340768"/>
-            <a:ext cx="1109970" cy="360040"/>
-          </a:xfrm>
-          <a:prstGeom prst="roundRect">
-            <a:avLst/>
-          </a:prstGeom>
-        </p:spPr>
-        <p:style>
-          <a:lnRef idx="2">
-            <a:schemeClr val="accent1">
-              <a:shade val="50000"/>
-            </a:schemeClr>
-          </a:lnRef>
-          <a:fillRef idx="1">
-            <a:schemeClr val="accent1"/>
-          </a:fillRef>
-          <a:effectRef idx="0">
-            <a:schemeClr val="accent1"/>
-          </a:effectRef>
-          <a:fontRef idx="minor">
-            <a:schemeClr val="lt1"/>
-          </a:fontRef>
-        </p:style>
-        <p:txBody>
-          <a:bodyPr rtlCol="0" anchor="ctr"/>
-          <a:lstStyle/>
-          <a:p>
-            <a:pPr algn="ctr"/>
-            <a:r>
-              <a:rPr lang="nl-NL" dirty="0" err="1" smtClean="0"/>
-              <a:t>Enriched</a:t>
-            </a:r>
-            <a:r>
-              <a:rPr lang="nl-NL" dirty="0" smtClean="0"/>
-              <a:t> XHTML</a:t>
-            </a:r>
-            <a:endParaRPr lang="nl-NL" dirty="0"/>
-          </a:p>
-        </p:txBody>
-      </p:sp>
-      <p:sp>
-        <p:nvSpPr>
-          <p:cNvPr id="9" name="Afgeronde rechthoek 8"/>
-          <p:cNvSpPr/>
-          <p:nvPr/>
-        </p:nvSpPr>
-        <p:spPr>
-          <a:xfrm>
-            <a:off x="4790472" y="2564904"/>
-            <a:ext cx="1109970" cy="360040"/>
-          </a:xfrm>
-          <a:prstGeom prst="roundRect">
-            <a:avLst/>
-          </a:prstGeom>
-        </p:spPr>
-        <p:style>
-          <a:lnRef idx="2">
-            <a:schemeClr val="accent1">
-              <a:shade val="50000"/>
-            </a:schemeClr>
-          </a:lnRef>
-          <a:fillRef idx="1">
-            <a:schemeClr val="accent1"/>
-          </a:fillRef>
-          <a:effectRef idx="0">
-            <a:schemeClr val="accent1"/>
-          </a:effectRef>
-          <a:fontRef idx="minor">
-            <a:schemeClr val="lt1"/>
-          </a:fontRef>
-        </p:style>
-        <p:txBody>
-          <a:bodyPr rtlCol="0" anchor="ctr"/>
-          <a:lstStyle/>
-          <a:p>
-            <a:pPr algn="ctr"/>
-            <a:r>
-              <a:rPr lang="nl-NL" dirty="0" smtClean="0"/>
-              <a:t>body</a:t>
-            </a:r>
-            <a:endParaRPr lang="nl-NL" dirty="0"/>
-          </a:p>
-        </p:txBody>
-      </p:sp>
-      <p:sp>
-        <p:nvSpPr>
-          <p:cNvPr id="10" name="Afgeronde rechthoek 9"/>
-          <p:cNvSpPr/>
-          <p:nvPr/>
-        </p:nvSpPr>
-        <p:spPr>
-          <a:xfrm>
-            <a:off x="3182769" y="3212976"/>
-            <a:ext cx="1109970" cy="360040"/>
-          </a:xfrm>
-          <a:prstGeom prst="roundRect">
-            <a:avLst/>
-          </a:prstGeom>
-        </p:spPr>
-        <p:style>
-          <a:lnRef idx="2">
-            <a:schemeClr val="accent1">
-              <a:shade val="50000"/>
-            </a:schemeClr>
-          </a:lnRef>
-          <a:fillRef idx="1">
-            <a:schemeClr val="accent1"/>
-          </a:fillRef>
-          <a:effectRef idx="0">
-            <a:schemeClr val="accent1"/>
-          </a:effectRef>
-          <a:fontRef idx="minor">
-            <a:schemeClr val="lt1"/>
-          </a:fontRef>
-        </p:style>
-        <p:txBody>
-          <a:bodyPr rtlCol="0" anchor="ctr"/>
-          <a:lstStyle/>
-          <a:p>
-            <a:pPr algn="ctr"/>
-            <a:r>
-              <a:rPr lang="nl-NL" dirty="0" smtClean="0"/>
-              <a:t>body</a:t>
-            </a:r>
-            <a:endParaRPr lang="nl-NL" dirty="0"/>
-          </a:p>
-        </p:txBody>
-      </p:sp>
-      <p:sp>
-        <p:nvSpPr>
-          <p:cNvPr id="14" name="Tekstvak 13"/>
-          <p:cNvSpPr txBox="1"/>
-          <p:nvPr/>
-        </p:nvSpPr>
-        <p:spPr>
-          <a:xfrm>
-            <a:off x="2056810" y="739733"/>
-            <a:ext cx="1036694" cy="276999"/>
-          </a:xfrm>
-          <a:prstGeom prst="rect">
-            <a:avLst/>
-          </a:prstGeom>
-          <a:noFill/>
-        </p:spPr>
-        <p:txBody>
-          <a:bodyPr wrap="none" rtlCol="0">
-            <a:spAutoFit/>
-          </a:bodyPr>
-          <a:lstStyle/>
-          <a:p>
-            <a:r>
-              <a:rPr lang="nl-NL" sz="1200" dirty="0" smtClean="0"/>
-              <a:t>input adapter</a:t>
-            </a:r>
-            <a:endParaRPr lang="nl-NL" sz="1200" dirty="0"/>
-          </a:p>
-        </p:txBody>
-      </p:sp>
-    </p:spTree>
-    <p:extLst>
-      <p:ext uri="{BB962C8B-B14F-4D97-AF65-F5344CB8AC3E}">
-        <p14:creationId xmlns:p14="http://schemas.microsoft.com/office/powerpoint/2010/main" val="2541372457"/>
       </p:ext>
     </p:extLst>
   </p:cSld>

</xml_diff>